<commit_message>
completed robustness section of report
</commit_message>
<xml_diff>
--- a/eqn_slides.pptx
+++ b/eqn_slides.pptx
@@ -12,7 +12,6 @@
     <p:sldId id="261" r:id="rId6"/>
     <p:sldId id="262" r:id="rId7"/>
     <p:sldId id="263" r:id="rId8"/>
-    <p:sldId id="260" r:id="rId9"/>
   </p:sldIdLst>
   <p:sldSz cx="12192000" cy="6858000"/>
   <p:notesSz cx="6858000" cy="9144000"/>
@@ -270,7 +269,7 @@
           <a:p>
             <a:fld id="{3899492A-6C5B-48E7-873A-FDECDB169B52}" type="datetimeFigureOut">
               <a:rPr lang="en-US" smtClean="0"/>
-              <a:t>11/15/2017</a:t>
+              <a:t>11/22/2017</a:t>
             </a:fld>
             <a:endParaRPr lang="en-US"/>
           </a:p>
@@ -468,7 +467,7 @@
           <a:p>
             <a:fld id="{3899492A-6C5B-48E7-873A-FDECDB169B52}" type="datetimeFigureOut">
               <a:rPr lang="en-US" smtClean="0"/>
-              <a:t>11/15/2017</a:t>
+              <a:t>11/22/2017</a:t>
             </a:fld>
             <a:endParaRPr lang="en-US"/>
           </a:p>
@@ -676,7 +675,7 @@
           <a:p>
             <a:fld id="{3899492A-6C5B-48E7-873A-FDECDB169B52}" type="datetimeFigureOut">
               <a:rPr lang="en-US" smtClean="0"/>
-              <a:t>11/15/2017</a:t>
+              <a:t>11/22/2017</a:t>
             </a:fld>
             <a:endParaRPr lang="en-US"/>
           </a:p>
@@ -874,7 +873,7 @@
           <a:p>
             <a:fld id="{3899492A-6C5B-48E7-873A-FDECDB169B52}" type="datetimeFigureOut">
               <a:rPr lang="en-US" smtClean="0"/>
-              <a:t>11/15/2017</a:t>
+              <a:t>11/22/2017</a:t>
             </a:fld>
             <a:endParaRPr lang="en-US"/>
           </a:p>
@@ -1149,7 +1148,7 @@
           <a:p>
             <a:fld id="{3899492A-6C5B-48E7-873A-FDECDB169B52}" type="datetimeFigureOut">
               <a:rPr lang="en-US" smtClean="0"/>
-              <a:t>11/15/2017</a:t>
+              <a:t>11/22/2017</a:t>
             </a:fld>
             <a:endParaRPr lang="en-US"/>
           </a:p>
@@ -1414,7 +1413,7 @@
           <a:p>
             <a:fld id="{3899492A-6C5B-48E7-873A-FDECDB169B52}" type="datetimeFigureOut">
               <a:rPr lang="en-US" smtClean="0"/>
-              <a:t>11/15/2017</a:t>
+              <a:t>11/22/2017</a:t>
             </a:fld>
             <a:endParaRPr lang="en-US"/>
           </a:p>
@@ -1826,7 +1825,7 @@
           <a:p>
             <a:fld id="{3899492A-6C5B-48E7-873A-FDECDB169B52}" type="datetimeFigureOut">
               <a:rPr lang="en-US" smtClean="0"/>
-              <a:t>11/15/2017</a:t>
+              <a:t>11/22/2017</a:t>
             </a:fld>
             <a:endParaRPr lang="en-US"/>
           </a:p>
@@ -1967,7 +1966,7 @@
           <a:p>
             <a:fld id="{3899492A-6C5B-48E7-873A-FDECDB169B52}" type="datetimeFigureOut">
               <a:rPr lang="en-US" smtClean="0"/>
-              <a:t>11/15/2017</a:t>
+              <a:t>11/22/2017</a:t>
             </a:fld>
             <a:endParaRPr lang="en-US"/>
           </a:p>
@@ -2080,7 +2079,7 @@
           <a:p>
             <a:fld id="{3899492A-6C5B-48E7-873A-FDECDB169B52}" type="datetimeFigureOut">
               <a:rPr lang="en-US" smtClean="0"/>
-              <a:t>11/15/2017</a:t>
+              <a:t>11/22/2017</a:t>
             </a:fld>
             <a:endParaRPr lang="en-US"/>
           </a:p>
@@ -2391,7 +2390,7 @@
           <a:p>
             <a:fld id="{3899492A-6C5B-48E7-873A-FDECDB169B52}" type="datetimeFigureOut">
               <a:rPr lang="en-US" smtClean="0"/>
-              <a:t>11/15/2017</a:t>
+              <a:t>11/22/2017</a:t>
             </a:fld>
             <a:endParaRPr lang="en-US"/>
           </a:p>
@@ -2679,7 +2678,7 @@
           <a:p>
             <a:fld id="{3899492A-6C5B-48E7-873A-FDECDB169B52}" type="datetimeFigureOut">
               <a:rPr lang="en-US" smtClean="0"/>
-              <a:t>11/15/2017</a:t>
+              <a:t>11/22/2017</a:t>
             </a:fld>
             <a:endParaRPr lang="en-US"/>
           </a:p>
@@ -2920,7 +2919,7 @@
           <a:p>
             <a:fld id="{3899492A-6C5B-48E7-873A-FDECDB169B52}" type="datetimeFigureOut">
               <a:rPr lang="en-US" smtClean="0"/>
-              <a:t>11/15/2017</a:t>
+              <a:t>11/22/2017</a:t>
             </a:fld>
             <a:endParaRPr lang="en-US"/>
           </a:p>
@@ -3353,8 +3352,8 @@
             </p:nvSpPr>
             <p:spPr>
               <a:xfrm>
-                <a:off x="1030884" y="268085"/>
-                <a:ext cx="9704248" cy="6771084"/>
+                <a:off x="1030884" y="243512"/>
+                <a:ext cx="9704248" cy="6370975"/>
               </a:xfrm>
               <a:prstGeom prst="rect">
                 <a:avLst/>
@@ -3368,7 +3367,7 @@
               <a:lstStyle/>
               <a:p>
                 <a:r>
-                  <a:rPr lang="en-US" sz="2000" b="0" dirty="0">
+                  <a:rPr lang="en-US" b="0" dirty="0">
                     <a:latin typeface="Cambria Math" panose="02040503050406030204" pitchFamily="18" charset="0"/>
                   </a:rPr>
                   <a:t>Values:</a:t>
@@ -3383,43 +3382,43 @@
                     </m:oMathParaPr>
                     <m:oMath xmlns:m="http://schemas.openxmlformats.org/officeDocument/2006/math">
                       <m:r>
-                        <a:rPr lang="en-US" sz="2000" b="0" i="1" smtClean="0">
+                        <a:rPr lang="en-US" b="0" i="1" smtClean="0">
                           <a:latin typeface="Cambria Math" panose="02040503050406030204" pitchFamily="18" charset="0"/>
                         </a:rPr>
                         <m:t>𝑚</m:t>
                       </m:r>
                       <m:r>
-                        <a:rPr lang="en-US" sz="2000" b="0" i="1" smtClean="0">
+                        <a:rPr lang="en-US" b="0" i="1" smtClean="0">
                           <a:latin typeface="Cambria Math" panose="02040503050406030204" pitchFamily="18" charset="0"/>
                         </a:rPr>
                         <m:t>:</m:t>
                       </m:r>
                       <m:r>
-                        <a:rPr lang="en-US" sz="2000" b="0" i="1" smtClean="0">
+                        <a:rPr lang="en-US" b="0" i="1" smtClean="0">
                           <a:latin typeface="Cambria Math" panose="02040503050406030204" pitchFamily="18" charset="0"/>
                         </a:rPr>
                         <m:t>𝑛𝑢𝑚𝑏𝑒𝑟</m:t>
                       </m:r>
                       <m:r>
-                        <a:rPr lang="en-US" sz="2000" b="0" i="1" smtClean="0">
+                        <a:rPr lang="en-US" b="0" i="1" smtClean="0">
                           <a:latin typeface="Cambria Math" panose="02040503050406030204" pitchFamily="18" charset="0"/>
                         </a:rPr>
                         <m:t> </m:t>
                       </m:r>
                       <m:r>
-                        <a:rPr lang="en-US" sz="2000" b="0" i="1" smtClean="0">
+                        <a:rPr lang="en-US" b="0" i="1" smtClean="0">
                           <a:latin typeface="Cambria Math" panose="02040503050406030204" pitchFamily="18" charset="0"/>
                         </a:rPr>
                         <m:t>𝑜𝑓</m:t>
                       </m:r>
                       <m:r>
-                        <a:rPr lang="en-US" sz="2000" b="0" i="1" smtClean="0">
+                        <a:rPr lang="en-US" b="0" i="1" smtClean="0">
                           <a:latin typeface="Cambria Math" panose="02040503050406030204" pitchFamily="18" charset="0"/>
                         </a:rPr>
                         <m:t> </m:t>
                       </m:r>
                       <m:r>
-                        <a:rPr lang="en-US" sz="2000" b="0" i="1" smtClean="0">
+                        <a:rPr lang="en-US" b="0" i="1" smtClean="0">
                           <a:latin typeface="Cambria Math" panose="02040503050406030204" pitchFamily="18" charset="0"/>
                         </a:rPr>
                         <m:t>𝑚𝑜𝑑𝑢𝑙𝑒𝑠</m:t>
@@ -3427,7 +3426,7 @@
                     </m:oMath>
                   </m:oMathPara>
                 </a14:m>
-                <a:endParaRPr lang="en-US" sz="2000" i="1" dirty="0">
+                <a:endParaRPr lang="en-US" i="1" dirty="0">
                   <a:latin typeface="Cambria Math" panose="02040503050406030204" pitchFamily="18" charset="0"/>
                 </a:endParaRPr>
               </a:p>
@@ -3440,43 +3439,43 @@
                     </m:oMathParaPr>
                     <m:oMath xmlns:m="http://schemas.openxmlformats.org/officeDocument/2006/math">
                       <m:r>
-                        <a:rPr lang="en-US" sz="2000" b="0" i="1" smtClean="0">
+                        <a:rPr lang="en-US" b="0" i="1" smtClean="0">
                           <a:latin typeface="Cambria Math" panose="02040503050406030204" pitchFamily="18" charset="0"/>
                         </a:rPr>
                         <m:t>𝑠</m:t>
                       </m:r>
                       <m:r>
-                        <a:rPr lang="en-US" sz="2000" b="0" i="1" smtClean="0">
+                        <a:rPr lang="en-US" b="0" i="1" smtClean="0">
                           <a:latin typeface="Cambria Math" panose="02040503050406030204" pitchFamily="18" charset="0"/>
                         </a:rPr>
                         <m:t>:</m:t>
                       </m:r>
                       <m:r>
-                        <a:rPr lang="en-US" sz="2000" b="0" i="1" smtClean="0">
+                        <a:rPr lang="en-US" b="0" i="1" smtClean="0">
                           <a:latin typeface="Cambria Math" panose="02040503050406030204" pitchFamily="18" charset="0"/>
                         </a:rPr>
                         <m:t>𝑛𝑢𝑚𝑏𝑒𝑟</m:t>
                       </m:r>
                       <m:r>
-                        <a:rPr lang="en-US" sz="2000" b="0" i="1" smtClean="0">
+                        <a:rPr lang="en-US" b="0" i="1" smtClean="0">
                           <a:latin typeface="Cambria Math" panose="02040503050406030204" pitchFamily="18" charset="0"/>
                         </a:rPr>
                         <m:t> </m:t>
                       </m:r>
                       <m:r>
-                        <a:rPr lang="en-US" sz="2000" b="0" i="1" smtClean="0">
+                        <a:rPr lang="en-US" b="0" i="1" smtClean="0">
                           <a:latin typeface="Cambria Math" panose="02040503050406030204" pitchFamily="18" charset="0"/>
                         </a:rPr>
                         <m:t>𝑜𝑓</m:t>
                       </m:r>
                       <m:r>
-                        <a:rPr lang="en-US" sz="2000" b="0" i="1" smtClean="0">
+                        <a:rPr lang="en-US" b="0" i="1" smtClean="0">
                           <a:latin typeface="Cambria Math" panose="02040503050406030204" pitchFamily="18" charset="0"/>
                         </a:rPr>
                         <m:t> </m:t>
                       </m:r>
                       <m:r>
-                        <a:rPr lang="en-US" sz="2000" b="0" i="1" smtClean="0">
+                        <a:rPr lang="en-US" b="0" i="1" smtClean="0">
                           <a:latin typeface="Cambria Math" panose="02040503050406030204" pitchFamily="18" charset="0"/>
                         </a:rPr>
                         <m:t>𝑡𝑖𝑚𝑒𝑠𝑙𝑜𝑡𝑠</m:t>
@@ -3484,7 +3483,7 @@
                     </m:oMath>
                   </m:oMathPara>
                 </a14:m>
-                <a:endParaRPr lang="en-US" sz="2000" i="1" dirty="0">
+                <a:endParaRPr lang="en-US" i="1" dirty="0">
                   <a:latin typeface="Cambria Math" panose="02040503050406030204" pitchFamily="18" charset="0"/>
                 </a:endParaRPr>
               </a:p>
@@ -3497,55 +3496,55 @@
                     </m:oMathParaPr>
                     <m:oMath xmlns:m="http://schemas.openxmlformats.org/officeDocument/2006/math">
                       <m:r>
-                        <a:rPr lang="en-US" sz="2000" b="0" i="1" smtClean="0">
+                        <a:rPr lang="en-US" b="0" i="1" smtClean="0">
                           <a:latin typeface="Cambria Math" panose="02040503050406030204" pitchFamily="18" charset="0"/>
                         </a:rPr>
                         <m:t>𝑛</m:t>
                       </m:r>
                       <m:r>
-                        <a:rPr lang="en-US" sz="2000" b="0" i="1" smtClean="0">
+                        <a:rPr lang="en-US" b="0" i="1" smtClean="0">
                           <a:latin typeface="Cambria Math" panose="02040503050406030204" pitchFamily="18" charset="0"/>
                         </a:rPr>
                         <m:t>:</m:t>
                       </m:r>
                       <m:r>
-                        <a:rPr lang="en-US" sz="2000" b="0" i="1" smtClean="0">
+                        <a:rPr lang="en-US" b="0" i="1" smtClean="0">
                           <a:latin typeface="Cambria Math" panose="02040503050406030204" pitchFamily="18" charset="0"/>
                         </a:rPr>
                         <m:t>𝑛𝑢𝑚𝑏𝑒𝑟</m:t>
                       </m:r>
                       <m:r>
-                        <a:rPr lang="en-US" sz="2000" b="0" i="1" smtClean="0">
+                        <a:rPr lang="en-US" b="0" i="1" smtClean="0">
                           <a:latin typeface="Cambria Math" panose="02040503050406030204" pitchFamily="18" charset="0"/>
                         </a:rPr>
                         <m:t> </m:t>
                       </m:r>
                       <m:r>
-                        <a:rPr lang="en-US" sz="2000" b="0" i="1" smtClean="0">
+                        <a:rPr lang="en-US" b="0" i="1" smtClean="0">
                           <a:latin typeface="Cambria Math" panose="02040503050406030204" pitchFamily="18" charset="0"/>
                         </a:rPr>
                         <m:t>𝑜𝑓</m:t>
                       </m:r>
                       <m:r>
-                        <a:rPr lang="en-US" sz="2000" b="0" i="1" smtClean="0">
+                        <a:rPr lang="en-US" b="0" i="1" smtClean="0">
                           <a:latin typeface="Cambria Math" panose="02040503050406030204" pitchFamily="18" charset="0"/>
                         </a:rPr>
                         <m:t> </m:t>
                       </m:r>
                       <m:r>
-                        <a:rPr lang="en-US" sz="2000" b="0" i="1" smtClean="0">
+                        <a:rPr lang="en-US" b="0" i="1" smtClean="0">
                           <a:latin typeface="Cambria Math" panose="02040503050406030204" pitchFamily="18" charset="0"/>
                         </a:rPr>
                         <m:t>𝑚𝑜𝑑𝑢𝑙𝑒</m:t>
                       </m:r>
                       <m:r>
-                        <a:rPr lang="en-US" sz="2000" b="0" i="1" smtClean="0">
+                        <a:rPr lang="en-US" b="0" i="1" smtClean="0">
                           <a:latin typeface="Cambria Math" panose="02040503050406030204" pitchFamily="18" charset="0"/>
                         </a:rPr>
                         <m:t>−</m:t>
                       </m:r>
                       <m:r>
-                        <a:rPr lang="en-US" sz="2000" b="0" i="1" smtClean="0">
+                        <a:rPr lang="en-US" b="0" i="1" smtClean="0">
                           <a:latin typeface="Cambria Math" panose="02040503050406030204" pitchFamily="18" charset="0"/>
                         </a:rPr>
                         <m:t>𝑠𝑒𝑐𝑡𝑖𝑜𝑛𝑎𝑙𝑠</m:t>
@@ -3553,14 +3552,13 @@
                     </m:oMath>
                   </m:oMathPara>
                 </a14:m>
-                <a:endParaRPr lang="en-US" sz="2000" b="0" i="1" dirty="0">
+                <a:endParaRPr lang="en-US" b="0" i="1" dirty="0">
                   <a:latin typeface="Cambria Math" panose="02040503050406030204" pitchFamily="18" charset="0"/>
                 </a:endParaRPr>
               </a:p>
               <a:p>
-                <a:pPr/>
                 <a:r>
-                  <a:rPr lang="en-US" sz="2000" i="1" dirty="0">
+                  <a:rPr lang="en-US" i="1" dirty="0">
                     <a:latin typeface="Cambria Math" panose="02040503050406030204" pitchFamily="18" charset="0"/>
                   </a:rPr>
                   <a:t>			</a:t>
@@ -3568,114 +3566,114 @@
                 <a14:m>
                   <m:oMath xmlns:m="http://schemas.openxmlformats.org/officeDocument/2006/math">
                     <m:r>
-                      <a:rPr lang="en-US" sz="2000" b="0" i="1" smtClean="0">
+                      <a:rPr lang="en-US" b="0" i="1" smtClean="0">
                         <a:latin typeface="Cambria Math" panose="02040503050406030204" pitchFamily="18" charset="0"/>
                       </a:rPr>
                       <m:t>𝑑</m:t>
                     </m:r>
                     <m:r>
-                      <a:rPr lang="en-US" sz="2000" b="0" i="1" smtClean="0">
+                      <a:rPr lang="en-US" b="0" i="1" smtClean="0">
                         <a:latin typeface="Cambria Math" panose="02040503050406030204" pitchFamily="18" charset="0"/>
                       </a:rPr>
                       <m:t>:</m:t>
                     </m:r>
                     <m:r>
-                      <a:rPr lang="en-US" sz="2000" b="0" i="1" smtClean="0">
+                      <a:rPr lang="en-US" b="0" i="1" smtClean="0">
                         <a:latin typeface="Cambria Math" panose="02040503050406030204" pitchFamily="18" charset="0"/>
                       </a:rPr>
                       <m:t>𝑛𝑢𝑚𝑏𝑒𝑟</m:t>
                     </m:r>
                     <m:r>
-                      <a:rPr lang="en-US" sz="2000" b="0" i="1" smtClean="0">
+                      <a:rPr lang="en-US" b="0" i="1" smtClean="0">
                         <a:latin typeface="Cambria Math" panose="02040503050406030204" pitchFamily="18" charset="0"/>
                       </a:rPr>
                       <m:t> </m:t>
                     </m:r>
                     <m:r>
-                      <a:rPr lang="en-US" sz="2000" b="0" i="1" smtClean="0">
+                      <a:rPr lang="en-US" b="0" i="1" smtClean="0">
                         <a:latin typeface="Cambria Math" panose="02040503050406030204" pitchFamily="18" charset="0"/>
                       </a:rPr>
                       <m:t>𝑜𝑓</m:t>
                     </m:r>
                     <m:r>
-                      <a:rPr lang="en-US" sz="2000" b="0" i="1" smtClean="0">
+                      <a:rPr lang="en-US" b="0" i="1" smtClean="0">
                         <a:latin typeface="Cambria Math" panose="02040503050406030204" pitchFamily="18" charset="0"/>
                       </a:rPr>
                       <m:t> </m:t>
                     </m:r>
                     <m:r>
-                      <a:rPr lang="en-US" sz="2000" b="0" i="1" smtClean="0">
+                      <a:rPr lang="en-US" b="0" i="1" smtClean="0">
                         <a:latin typeface="Cambria Math" panose="02040503050406030204" pitchFamily="18" charset="0"/>
                       </a:rPr>
                       <m:t>𝑐𝑢𝑟𝑟𝑖𝑐𝑢𝑙𝑢𝑚</m:t>
                     </m:r>
                     <m:r>
-                      <a:rPr lang="en-US" sz="2000" b="0" i="1" smtClean="0">
+                      <a:rPr lang="en-US" b="0" i="1" smtClean="0">
                         <a:latin typeface="Cambria Math" panose="02040503050406030204" pitchFamily="18" charset="0"/>
                       </a:rPr>
                       <m:t> </m:t>
                     </m:r>
                     <m:r>
-                      <a:rPr lang="en-US" sz="2000" b="0" i="1" smtClean="0">
+                      <a:rPr lang="en-US" b="0" i="1" smtClean="0">
                         <a:latin typeface="Cambria Math" panose="02040503050406030204" pitchFamily="18" charset="0"/>
                       </a:rPr>
                       <m:t>𝑑𝑎𝑦𝑠</m:t>
                     </m:r>
                     <m:r>
-                      <a:rPr lang="en-US" sz="2000" b="0" i="1" smtClean="0">
+                      <a:rPr lang="en-US" b="0" i="1" smtClean="0">
                         <a:latin typeface="Cambria Math" panose="02040503050406030204" pitchFamily="18" charset="0"/>
                       </a:rPr>
                       <m:t> </m:t>
                     </m:r>
                     <m:r>
-                      <a:rPr lang="en-US" sz="2000" b="0" i="1" smtClean="0">
+                      <a:rPr lang="en-US" b="0" i="1" smtClean="0">
                         <a:latin typeface="Cambria Math" panose="02040503050406030204" pitchFamily="18" charset="0"/>
                       </a:rPr>
                       <m:t>𝑖𝑛</m:t>
                     </m:r>
                     <m:r>
-                      <a:rPr lang="en-US" sz="2000" b="0" i="1" smtClean="0">
+                      <a:rPr lang="en-US" b="0" i="1" smtClean="0">
                         <a:latin typeface="Cambria Math" panose="02040503050406030204" pitchFamily="18" charset="0"/>
                       </a:rPr>
                       <m:t> </m:t>
                     </m:r>
                     <m:r>
-                      <a:rPr lang="en-US" sz="2000" b="0" i="1" smtClean="0">
+                      <a:rPr lang="en-US" b="0" i="1" smtClean="0">
                         <a:latin typeface="Cambria Math" panose="02040503050406030204" pitchFamily="18" charset="0"/>
                       </a:rPr>
                       <m:t>𝑎</m:t>
                     </m:r>
                     <m:r>
-                      <a:rPr lang="en-US" sz="2000" b="0" i="1" smtClean="0">
+                      <a:rPr lang="en-US" b="0" i="1" smtClean="0">
                         <a:latin typeface="Cambria Math" panose="02040503050406030204" pitchFamily="18" charset="0"/>
                       </a:rPr>
                       <m:t> </m:t>
                     </m:r>
                     <m:r>
-                      <a:rPr lang="en-US" sz="2000" b="0" i="1" smtClean="0">
+                      <a:rPr lang="en-US" b="0" i="1" smtClean="0">
                         <a:latin typeface="Cambria Math" panose="02040503050406030204" pitchFamily="18" charset="0"/>
                       </a:rPr>
                       <m:t>𝑤𝑒𝑒𝑘</m:t>
                     </m:r>
                   </m:oMath>
                 </a14:m>
-                <a:endParaRPr lang="en-US" sz="2000" b="0" i="1" dirty="0">
+                <a:endParaRPr lang="en-US" b="0" i="1" dirty="0">
                   <a:latin typeface="Cambria Math" panose="02040503050406030204" pitchFamily="18" charset="0"/>
                 </a:endParaRPr>
               </a:p>
               <a:p>
-                <a:endParaRPr lang="en-US" sz="2000" b="0" i="1" dirty="0">
+                <a:endParaRPr lang="en-US" b="0" i="1" dirty="0">
                   <a:latin typeface="Cambria Math" panose="02040503050406030204" pitchFamily="18" charset="0"/>
                 </a:endParaRPr>
               </a:p>
               <a:p>
                 <a:r>
-                  <a:rPr lang="en-US" sz="2000" dirty="0">
+                  <a:rPr lang="en-US" dirty="0">
                     <a:latin typeface="Cambria Math" panose="02040503050406030204" pitchFamily="18" charset="0"/>
                   </a:rPr>
                   <a:t>Data scraped:</a:t>
                 </a:r>
-                <a:endParaRPr lang="en-US" sz="2000" b="0" dirty="0">
+                <a:endParaRPr lang="en-US" b="0" dirty="0">
                   <a:latin typeface="Cambria Math" panose="02040503050406030204" pitchFamily="18" charset="0"/>
                 </a:endParaRPr>
               </a:p>
@@ -3690,14 +3688,14 @@
                       <m:sSub>
                         <m:sSubPr>
                           <m:ctrlPr>
-                            <a:rPr lang="en-US" sz="2000" b="0" i="1" smtClean="0">
+                            <a:rPr lang="en-US" b="0" i="1" smtClean="0">
                               <a:latin typeface="Cambria Math" panose="02040503050406030204" pitchFamily="18" charset="0"/>
                             </a:rPr>
                           </m:ctrlPr>
                         </m:sSubPr>
                         <m:e>
                           <m:r>
-                            <a:rPr lang="en-US" sz="2000" b="0" i="1" smtClean="0">
+                            <a:rPr lang="en-US" b="0" i="1" smtClean="0">
                               <a:latin typeface="Cambria Math" panose="02040503050406030204" pitchFamily="18" charset="0"/>
                             </a:rPr>
                             <m:t>𝑝</m:t>
@@ -3705,7 +3703,7 @@
                         </m:e>
                         <m:sub>
                           <m:r>
-                            <a:rPr lang="en-US" sz="2000" b="0" i="1" smtClean="0">
+                            <a:rPr lang="en-US" b="0" i="1" smtClean="0">
                               <a:latin typeface="Cambria Math" panose="02040503050406030204" pitchFamily="18" charset="0"/>
                             </a:rPr>
                             <m:t>𝑟</m:t>
@@ -3713,19 +3711,19 @@
                         </m:sub>
                       </m:sSub>
                       <m:r>
-                        <a:rPr lang="en-US" sz="2000" b="0" i="1" smtClean="0">
+                        <a:rPr lang="en-US" b="0" i="1" smtClean="0">
                           <a:latin typeface="Cambria Math" panose="02040503050406030204" pitchFamily="18" charset="0"/>
                         </a:rPr>
                         <m:t>:</m:t>
                       </m:r>
                       <m:r>
-                        <a:rPr lang="en-US" sz="2000" b="0" i="1" smtClean="0">
+                        <a:rPr lang="en-US" b="0" i="1" smtClean="0">
                           <a:latin typeface="Cambria Math" panose="02040503050406030204" pitchFamily="18" charset="0"/>
                         </a:rPr>
                         <m:t>𝑝𝑟𝑒𝑟𝑒𝑞𝑢𝑖𝑠𝑖𝑡𝑒𝑠</m:t>
                       </m:r>
                       <m:r>
-                        <a:rPr lang="en-US" sz="2000" b="0" i="1" smtClean="0">
+                        <a:rPr lang="en-US" b="0" i="1" smtClean="0">
                           <a:latin typeface="Cambria Math" panose="02040503050406030204" pitchFamily="18" charset="0"/>
                           <a:ea typeface="Cambria Math" panose="02040503050406030204" pitchFamily="18" charset="0"/>
                         </a:rPr>
@@ -3734,7 +3732,7 @@
                       <m:sSubSup>
                         <m:sSubSupPr>
                           <m:ctrlPr>
-                            <a:rPr lang="en-US" sz="2000" b="0" i="1" smtClean="0">
+                            <a:rPr lang="en-US" b="0" i="1" smtClean="0">
                               <a:latin typeface="Cambria Math" panose="02040503050406030204" pitchFamily="18" charset="0"/>
                               <a:ea typeface="Cambria Math" panose="02040503050406030204" pitchFamily="18" charset="0"/>
                             </a:rPr>
@@ -3742,7 +3740,7 @@
                         </m:sSubSupPr>
                         <m:e>
                           <m:r>
-                            <a:rPr lang="en-US" sz="2000" i="1">
+                            <a:rPr lang="en-US" i="1">
                               <a:latin typeface="Cambria Math" panose="02040503050406030204" pitchFamily="18" charset="0"/>
                               <a:ea typeface="Cambria Math" panose="02040503050406030204" pitchFamily="18" charset="0"/>
                             </a:rPr>
@@ -3751,7 +3749,7 @@
                         </m:e>
                         <m:sub>
                           <m:r>
-                            <a:rPr lang="en-US" sz="2000" b="0" i="1" smtClean="0">
+                            <a:rPr lang="en-US" b="0" i="1" smtClean="0">
                               <a:latin typeface="Cambria Math" panose="02040503050406030204" pitchFamily="18" charset="0"/>
                               <a:ea typeface="Cambria Math" panose="02040503050406030204" pitchFamily="18" charset="0"/>
                             </a:rPr>
@@ -3760,21 +3758,21 @@
                         </m:sub>
                         <m:sup>
                           <m:r>
-                            <a:rPr lang="en-US" sz="2000" b="0" i="1" smtClean="0">
+                            <a:rPr lang="en-US" b="0" i="1" smtClean="0">
                               <a:latin typeface="Cambria Math" panose="02040503050406030204" pitchFamily="18" charset="0"/>
                               <a:ea typeface="Cambria Math" panose="02040503050406030204" pitchFamily="18" charset="0"/>
                             </a:rPr>
                             <m:t>𝑚</m:t>
                           </m:r>
                           <m:r>
-                            <a:rPr lang="en-US" sz="2000" b="0" i="1" smtClean="0">
+                            <a:rPr lang="en-US" b="0" i="1" smtClean="0">
                               <a:latin typeface="Cambria Math" panose="02040503050406030204" pitchFamily="18" charset="0"/>
                               <a:ea typeface="Cambria Math" panose="02040503050406030204" pitchFamily="18" charset="0"/>
                             </a:rPr>
                             <m:t>×</m:t>
                           </m:r>
                           <m:r>
-                            <a:rPr lang="en-US" sz="2000" b="0" i="1" smtClean="0">
+                            <a:rPr lang="en-US" b="0" i="1" smtClean="0">
                               <a:latin typeface="Cambria Math" panose="02040503050406030204" pitchFamily="18" charset="0"/>
                               <a:ea typeface="Cambria Math" panose="02040503050406030204" pitchFamily="18" charset="0"/>
                             </a:rPr>
@@ -3785,7 +3783,7 @@
                     </m:oMath>
                   </m:oMathPara>
                 </a14:m>
-                <a:endParaRPr lang="en-US" sz="2000" b="0" i="1" dirty="0">
+                <a:endParaRPr lang="en-US" b="0" i="1" dirty="0">
                   <a:latin typeface="Cambria Math" panose="02040503050406030204" pitchFamily="18" charset="0"/>
                 </a:endParaRPr>
               </a:p>
@@ -3800,14 +3798,14 @@
                       <m:sSub>
                         <m:sSubPr>
                           <m:ctrlPr>
-                            <a:rPr lang="en-US" sz="2000" b="0" i="1" smtClean="0">
+                            <a:rPr lang="en-US" b="0" i="1" smtClean="0">
                               <a:latin typeface="Cambria Math" panose="02040503050406030204" pitchFamily="18" charset="0"/>
                             </a:rPr>
                           </m:ctrlPr>
                         </m:sSubPr>
                         <m:e>
                           <m:r>
-                            <a:rPr lang="en-US" sz="2000" b="0" i="1" smtClean="0">
+                            <a:rPr lang="en-US" b="0" i="1" smtClean="0">
                               <a:latin typeface="Cambria Math" panose="02040503050406030204" pitchFamily="18" charset="0"/>
                             </a:rPr>
                             <m:t>𝑝</m:t>
@@ -3815,7 +3813,7 @@
                         </m:e>
                         <m:sub>
                           <m:r>
-                            <a:rPr lang="en-US" sz="2000" b="0" i="1" smtClean="0">
+                            <a:rPr lang="en-US" b="0" i="1" smtClean="0">
                               <a:latin typeface="Cambria Math" panose="02040503050406030204" pitchFamily="18" charset="0"/>
                             </a:rPr>
                             <m:t>𝑐</m:t>
@@ -3823,19 +3821,19 @@
                         </m:sub>
                       </m:sSub>
                       <m:r>
-                        <a:rPr lang="en-US" sz="2000" b="0" i="1" smtClean="0">
+                        <a:rPr lang="en-US" b="0" i="1" smtClean="0">
                           <a:latin typeface="Cambria Math" panose="02040503050406030204" pitchFamily="18" charset="0"/>
                         </a:rPr>
                         <m:t>:</m:t>
                       </m:r>
                       <m:r>
-                        <a:rPr lang="en-US" sz="2000" b="0" i="1" smtClean="0">
+                        <a:rPr lang="en-US" b="0" i="1" smtClean="0">
                           <a:latin typeface="Cambria Math" panose="02040503050406030204" pitchFamily="18" charset="0"/>
                         </a:rPr>
                         <m:t>𝑝𝑟𝑒𝑐𝑙𝑢𝑠𝑖𝑜𝑛𝑠</m:t>
                       </m:r>
                       <m:r>
-                        <a:rPr lang="en-US" sz="2000" b="0" i="1" smtClean="0">
+                        <a:rPr lang="en-US" b="0" i="1" smtClean="0">
                           <a:latin typeface="Cambria Math" panose="02040503050406030204" pitchFamily="18" charset="0"/>
                           <a:ea typeface="Cambria Math" panose="02040503050406030204" pitchFamily="18" charset="0"/>
                         </a:rPr>
@@ -3844,7 +3842,7 @@
                       <m:sSubSup>
                         <m:sSubSupPr>
                           <m:ctrlPr>
-                            <a:rPr lang="en-US" sz="2000" b="0" i="1" smtClean="0">
+                            <a:rPr lang="en-US" b="0" i="1" smtClean="0">
                               <a:latin typeface="Cambria Math" panose="02040503050406030204" pitchFamily="18" charset="0"/>
                               <a:ea typeface="Cambria Math" panose="02040503050406030204" pitchFamily="18" charset="0"/>
                             </a:rPr>
@@ -3852,7 +3850,7 @@
                         </m:sSubSupPr>
                         <m:e>
                           <m:r>
-                            <a:rPr lang="en-US" sz="2000" i="1" smtClean="0">
+                            <a:rPr lang="en-US" i="1" smtClean="0">
                               <a:latin typeface="Cambria Math" panose="02040503050406030204" pitchFamily="18" charset="0"/>
                               <a:ea typeface="Cambria Math" panose="02040503050406030204" pitchFamily="18" charset="0"/>
                             </a:rPr>
@@ -3861,7 +3859,7 @@
                         </m:e>
                         <m:sub>
                           <m:r>
-                            <a:rPr lang="en-US" sz="2000" b="0" i="1" smtClean="0">
+                            <a:rPr lang="en-US" b="0" i="1" smtClean="0">
                               <a:latin typeface="Cambria Math" panose="02040503050406030204" pitchFamily="18" charset="0"/>
                               <a:ea typeface="Cambria Math" panose="02040503050406030204" pitchFamily="18" charset="0"/>
                             </a:rPr>
@@ -3870,21 +3868,21 @@
                         </m:sub>
                         <m:sup>
                           <m:r>
-                            <a:rPr lang="en-US" sz="2000" b="0" i="1" smtClean="0">
+                            <a:rPr lang="en-US" b="0" i="1" smtClean="0">
                               <a:latin typeface="Cambria Math" panose="02040503050406030204" pitchFamily="18" charset="0"/>
                               <a:ea typeface="Cambria Math" panose="02040503050406030204" pitchFamily="18" charset="0"/>
                             </a:rPr>
                             <m:t>𝑚</m:t>
                           </m:r>
                           <m:r>
-                            <a:rPr lang="en-US" sz="2000" b="0" i="1" smtClean="0">
+                            <a:rPr lang="en-US" b="0" i="1" smtClean="0">
                               <a:latin typeface="Cambria Math" panose="02040503050406030204" pitchFamily="18" charset="0"/>
                               <a:ea typeface="Cambria Math" panose="02040503050406030204" pitchFamily="18" charset="0"/>
                             </a:rPr>
                             <m:t>×</m:t>
                           </m:r>
                           <m:r>
-                            <a:rPr lang="en-US" sz="2000" b="0" i="1" smtClean="0">
+                            <a:rPr lang="en-US" b="0" i="1" smtClean="0">
                               <a:latin typeface="Cambria Math" panose="02040503050406030204" pitchFamily="18" charset="0"/>
                               <a:ea typeface="Cambria Math" panose="02040503050406030204" pitchFamily="18" charset="0"/>
                             </a:rPr>
@@ -3895,7 +3893,7 @@
                     </m:oMath>
                   </m:oMathPara>
                 </a14:m>
-                <a:endParaRPr lang="en-US" sz="2000" i="1" dirty="0">
+                <a:endParaRPr lang="en-US" i="1" dirty="0">
                   <a:latin typeface="Cambria Math" panose="02040503050406030204" pitchFamily="18" charset="0"/>
                 </a:endParaRPr>
               </a:p>
@@ -3908,25 +3906,25 @@
                     </m:oMathParaPr>
                     <m:oMath xmlns:m="http://schemas.openxmlformats.org/officeDocument/2006/math">
                       <m:r>
-                        <a:rPr lang="en-US" sz="2000" b="0" i="1" smtClean="0">
+                        <a:rPr lang="en-US" b="0" i="1" smtClean="0">
                           <a:latin typeface="Cambria Math" panose="02040503050406030204" pitchFamily="18" charset="0"/>
                         </a:rPr>
                         <m:t>𝑡</m:t>
                       </m:r>
                       <m:r>
-                        <a:rPr lang="en-US" sz="2000" b="0" i="1" smtClean="0">
+                        <a:rPr lang="en-US" b="0" i="1" smtClean="0">
                           <a:latin typeface="Cambria Math" panose="02040503050406030204" pitchFamily="18" charset="0"/>
                         </a:rPr>
                         <m:t>: </m:t>
                       </m:r>
                       <m:r>
-                        <a:rPr lang="en-US" sz="2000" b="0" i="1" smtClean="0">
+                        <a:rPr lang="en-US" b="0" i="1" smtClean="0">
                           <a:latin typeface="Cambria Math" panose="02040503050406030204" pitchFamily="18" charset="0"/>
                         </a:rPr>
                         <m:t>𝑡𝑖𝑚𝑒𝑠𝑙𝑜𝑡𝑠</m:t>
                       </m:r>
                       <m:r>
-                        <a:rPr lang="en-US" sz="2000" b="0" i="1" smtClean="0">
+                        <a:rPr lang="en-US" b="0" i="1" smtClean="0">
                           <a:latin typeface="Cambria Math" panose="02040503050406030204" pitchFamily="18" charset="0"/>
                           <a:ea typeface="Cambria Math" panose="02040503050406030204" pitchFamily="18" charset="0"/>
                         </a:rPr>
@@ -3935,7 +3933,7 @@
                       <m:sSubSup>
                         <m:sSubSupPr>
                           <m:ctrlPr>
-                            <a:rPr lang="en-US" sz="2000" b="0" i="1" smtClean="0">
+                            <a:rPr lang="en-US" b="0" i="1" smtClean="0">
                               <a:latin typeface="Cambria Math" panose="02040503050406030204" pitchFamily="18" charset="0"/>
                               <a:ea typeface="Cambria Math" panose="02040503050406030204" pitchFamily="18" charset="0"/>
                             </a:rPr>
@@ -3943,7 +3941,7 @@
                         </m:sSubSupPr>
                         <m:e>
                           <m:r>
-                            <a:rPr lang="en-US" sz="2000" i="1" smtClean="0">
+                            <a:rPr lang="en-US" i="1" smtClean="0">
                               <a:latin typeface="Cambria Math" panose="02040503050406030204" pitchFamily="18" charset="0"/>
                               <a:ea typeface="Cambria Math" panose="02040503050406030204" pitchFamily="18" charset="0"/>
                             </a:rPr>
@@ -3952,7 +3950,7 @@
                         </m:e>
                         <m:sub>
                           <m:r>
-                            <a:rPr lang="en-US" sz="2000" b="0" i="1" smtClean="0">
+                            <a:rPr lang="en-US" b="0" i="1" smtClean="0">
                               <a:latin typeface="Cambria Math" panose="02040503050406030204" pitchFamily="18" charset="0"/>
                               <a:ea typeface="Cambria Math" panose="02040503050406030204" pitchFamily="18" charset="0"/>
                             </a:rPr>
@@ -3961,21 +3959,21 @@
                         </m:sub>
                         <m:sup>
                           <m:r>
-                            <a:rPr lang="en-US" sz="2000" b="0" i="1" smtClean="0">
+                            <a:rPr lang="en-US" b="0" i="1" smtClean="0">
                               <a:latin typeface="Cambria Math" panose="02040503050406030204" pitchFamily="18" charset="0"/>
                               <a:ea typeface="Cambria Math" panose="02040503050406030204" pitchFamily="18" charset="0"/>
                             </a:rPr>
                             <m:t>𝑛</m:t>
                           </m:r>
                           <m:r>
-                            <a:rPr lang="en-US" sz="2000" b="0" i="1" smtClean="0">
+                            <a:rPr lang="en-US" b="0" i="1" smtClean="0">
                               <a:latin typeface="Cambria Math" panose="02040503050406030204" pitchFamily="18" charset="0"/>
                               <a:ea typeface="Cambria Math" panose="02040503050406030204" pitchFamily="18" charset="0"/>
                             </a:rPr>
                             <m:t>×</m:t>
                           </m:r>
                           <m:r>
-                            <a:rPr lang="en-US" sz="2000" b="0" i="1" smtClean="0">
+                            <a:rPr lang="en-US" b="0" i="1" smtClean="0">
                               <a:latin typeface="Cambria Math" panose="02040503050406030204" pitchFamily="18" charset="0"/>
                               <a:ea typeface="Cambria Math" panose="02040503050406030204" pitchFamily="18" charset="0"/>
                             </a:rPr>
@@ -3986,7 +3984,7 @@
                     </m:oMath>
                   </m:oMathPara>
                 </a14:m>
-                <a:endParaRPr lang="en-US" sz="2000" i="1" dirty="0">
+                <a:endParaRPr lang="en-US" i="1" dirty="0">
                   <a:latin typeface="Cambria Math" panose="02040503050406030204" pitchFamily="18" charset="0"/>
                 </a:endParaRPr>
               </a:p>
@@ -3999,37 +3997,37 @@
                     </m:oMathParaPr>
                     <m:oMath xmlns:m="http://schemas.openxmlformats.org/officeDocument/2006/math">
                       <m:r>
-                        <a:rPr lang="en-US" sz="2000" b="0" i="1" smtClean="0">
+                        <a:rPr lang="en-US" b="0" i="1" smtClean="0">
                           <a:latin typeface="Cambria Math" panose="02040503050406030204" pitchFamily="18" charset="0"/>
                         </a:rPr>
                         <m:t>𝑒</m:t>
                       </m:r>
                       <m:r>
-                        <a:rPr lang="en-US" sz="2000" b="0" i="1" smtClean="0">
+                        <a:rPr lang="en-US" b="0" i="1" smtClean="0">
                           <a:latin typeface="Cambria Math" panose="02040503050406030204" pitchFamily="18" charset="0"/>
                         </a:rPr>
                         <m:t>:</m:t>
                       </m:r>
                       <m:r>
-                        <a:rPr lang="en-US" sz="2000" b="0" i="1" smtClean="0">
+                        <a:rPr lang="en-US" b="0" i="1" smtClean="0">
                           <a:latin typeface="Cambria Math" panose="02040503050406030204" pitchFamily="18" charset="0"/>
                         </a:rPr>
                         <m:t>𝑒𝑥𝑎𝑚</m:t>
                       </m:r>
                       <m:r>
-                        <a:rPr lang="en-US" sz="2000" b="0" i="1" smtClean="0">
+                        <a:rPr lang="en-US" b="0" i="1" smtClean="0">
                           <a:latin typeface="Cambria Math" panose="02040503050406030204" pitchFamily="18" charset="0"/>
                         </a:rPr>
                         <m:t> </m:t>
                       </m:r>
                       <m:r>
-                        <a:rPr lang="en-US" sz="2000" b="0" i="1" smtClean="0">
+                        <a:rPr lang="en-US" b="0" i="1" smtClean="0">
                           <a:latin typeface="Cambria Math" panose="02040503050406030204" pitchFamily="18" charset="0"/>
                         </a:rPr>
                         <m:t>𝑡𝑖𝑚𝑒𝑠𝑙𝑜𝑡𝑠</m:t>
                       </m:r>
                       <m:r>
-                        <a:rPr lang="en-US" sz="2000" b="0" i="1" smtClean="0">
+                        <a:rPr lang="en-US" b="0" i="1" smtClean="0">
                           <a:latin typeface="Cambria Math" panose="02040503050406030204" pitchFamily="18" charset="0"/>
                           <a:ea typeface="Cambria Math" panose="02040503050406030204" pitchFamily="18" charset="0"/>
                         </a:rPr>
@@ -4038,7 +4036,7 @@
                       <m:sSubSup>
                         <m:sSubSupPr>
                           <m:ctrlPr>
-                            <a:rPr lang="en-US" sz="2000" b="0" i="1" smtClean="0">
+                            <a:rPr lang="en-US" b="0" i="1" smtClean="0">
                               <a:latin typeface="Cambria Math" panose="02040503050406030204" pitchFamily="18" charset="0"/>
                               <a:ea typeface="Cambria Math" panose="02040503050406030204" pitchFamily="18" charset="0"/>
                             </a:rPr>
@@ -4046,7 +4044,7 @@
                         </m:sSubSupPr>
                         <m:e>
                           <m:r>
-                            <a:rPr lang="en-US" sz="2000" i="1">
+                            <a:rPr lang="en-US" i="1">
                               <a:latin typeface="Cambria Math" panose="02040503050406030204" pitchFamily="18" charset="0"/>
                               <a:ea typeface="Cambria Math" panose="02040503050406030204" pitchFamily="18" charset="0"/>
                             </a:rPr>
@@ -4055,7 +4053,7 @@
                         </m:e>
                         <m:sub>
                           <m:r>
-                            <a:rPr lang="en-US" sz="2000" b="0" i="1" smtClean="0">
+                            <a:rPr lang="en-US" b="0" i="1" smtClean="0">
                               <a:latin typeface="Cambria Math" panose="02040503050406030204" pitchFamily="18" charset="0"/>
                               <a:ea typeface="Cambria Math" panose="02040503050406030204" pitchFamily="18" charset="0"/>
                             </a:rPr>
@@ -4064,21 +4062,21 @@
                         </m:sub>
                         <m:sup>
                           <m:r>
-                            <a:rPr lang="en-US" sz="2000" b="0" i="1" smtClean="0">
+                            <a:rPr lang="en-US" b="0" i="1" smtClean="0">
                               <a:latin typeface="Cambria Math" panose="02040503050406030204" pitchFamily="18" charset="0"/>
                               <a:ea typeface="Cambria Math" panose="02040503050406030204" pitchFamily="18" charset="0"/>
                             </a:rPr>
                             <m:t>𝑚</m:t>
                           </m:r>
                           <m:r>
-                            <a:rPr lang="en-US" sz="2000" b="0" i="1" smtClean="0">
+                            <a:rPr lang="en-US" b="0" i="1" smtClean="0">
                               <a:latin typeface="Cambria Math" panose="02040503050406030204" pitchFamily="18" charset="0"/>
                               <a:ea typeface="Cambria Math" panose="02040503050406030204" pitchFamily="18" charset="0"/>
                             </a:rPr>
                             <m:t>×</m:t>
                           </m:r>
                           <m:r>
-                            <a:rPr lang="en-US" sz="2000" b="0" i="1" smtClean="0">
+                            <a:rPr lang="en-US" b="0" i="1" smtClean="0">
                               <a:latin typeface="Cambria Math" panose="02040503050406030204" pitchFamily="18" charset="0"/>
                               <a:ea typeface="Cambria Math" panose="02040503050406030204" pitchFamily="18" charset="0"/>
                             </a:rPr>
@@ -4089,18 +4087,18 @@
                     </m:oMath>
                   </m:oMathPara>
                 </a14:m>
-                <a:endParaRPr lang="en-US" sz="2000" i="1" dirty="0">
+                <a:endParaRPr lang="en-US" i="1" dirty="0">
                   <a:latin typeface="Cambria Math" panose="02040503050406030204" pitchFamily="18" charset="0"/>
                 </a:endParaRPr>
               </a:p>
               <a:p>
-                <a:endParaRPr lang="en-US" sz="2000" i="1" dirty="0">
+                <a:endParaRPr lang="en-US" i="1" dirty="0">
                   <a:latin typeface="Cambria Math" panose="02040503050406030204" pitchFamily="18" charset="0"/>
                 </a:endParaRPr>
               </a:p>
               <a:p>
                 <a:r>
-                  <a:rPr lang="en-US" sz="2000" dirty="0">
+                  <a:rPr lang="en-US" dirty="0">
                     <a:latin typeface="Cambria Math" panose="02040503050406030204" pitchFamily="18" charset="0"/>
                   </a:rPr>
                   <a:t>User input:</a:t>
@@ -4117,14 +4115,14 @@
                       <m:sSub>
                         <m:sSubPr>
                           <m:ctrlPr>
-                            <a:rPr lang="en-US" sz="2000" b="0" i="1" smtClean="0">
+                            <a:rPr lang="en-US" b="0" i="1" smtClean="0">
                               <a:latin typeface="Cambria Math" panose="02040503050406030204" pitchFamily="18" charset="0"/>
                             </a:rPr>
                           </m:ctrlPr>
                         </m:sSubPr>
                         <m:e>
                           <m:r>
-                            <a:rPr lang="en-US" sz="2000" b="0" i="1" smtClean="0">
+                            <a:rPr lang="en-US" b="0" i="1" smtClean="0">
                               <a:latin typeface="Cambria Math" panose="02040503050406030204" pitchFamily="18" charset="0"/>
                             </a:rPr>
                             <m:t>𝑚</m:t>
@@ -4132,7 +4130,7 @@
                         </m:e>
                         <m:sub>
                           <m:r>
-                            <a:rPr lang="en-US" sz="2000" b="0" i="1" smtClean="0">
+                            <a:rPr lang="en-US" b="0" i="1" smtClean="0">
                               <a:latin typeface="Cambria Math" panose="02040503050406030204" pitchFamily="18" charset="0"/>
                             </a:rPr>
                             <m:t>𝑡</m:t>
@@ -4140,43 +4138,43 @@
                         </m:sub>
                       </m:sSub>
                       <m:r>
-                        <a:rPr lang="en-US" sz="2000" b="0" i="1" smtClean="0">
+                        <a:rPr lang="en-US" b="0" i="1" smtClean="0">
                           <a:latin typeface="Cambria Math" panose="02040503050406030204" pitchFamily="18" charset="0"/>
                         </a:rPr>
                         <m:t>:</m:t>
                       </m:r>
                       <m:r>
-                        <a:rPr lang="en-US" sz="2000" b="0" i="1" smtClean="0">
+                        <a:rPr lang="en-US" b="0" i="1" smtClean="0">
                           <a:latin typeface="Cambria Math" panose="02040503050406030204" pitchFamily="18" charset="0"/>
                         </a:rPr>
                         <m:t>𝑚𝑜𝑑𝑢𝑙𝑒𝑠</m:t>
                       </m:r>
                       <m:r>
-                        <a:rPr lang="en-US" sz="2000" b="0" i="1" smtClean="0">
+                        <a:rPr lang="en-US" b="0" i="1" smtClean="0">
                           <a:latin typeface="Cambria Math" panose="02040503050406030204" pitchFamily="18" charset="0"/>
                         </a:rPr>
                         <m:t> </m:t>
                       </m:r>
                       <m:r>
-                        <a:rPr lang="en-US" sz="2000" b="0" i="1" smtClean="0">
+                        <a:rPr lang="en-US" b="0" i="1" smtClean="0">
                           <a:latin typeface="Cambria Math" panose="02040503050406030204" pitchFamily="18" charset="0"/>
                         </a:rPr>
                         <m:t>𝑡𝑎𝑘𝑒𝑛</m:t>
                       </m:r>
                       <m:r>
-                        <a:rPr lang="en-US" sz="2000" b="0" i="1" smtClean="0">
+                        <a:rPr lang="en-US" b="0" i="1" smtClean="0">
                           <a:latin typeface="Cambria Math" panose="02040503050406030204" pitchFamily="18" charset="0"/>
                         </a:rPr>
                         <m:t> </m:t>
                       </m:r>
                       <m:r>
-                        <a:rPr lang="en-US" sz="2000" b="0" i="1" smtClean="0">
+                        <a:rPr lang="en-US" b="0" i="1" smtClean="0">
                           <a:latin typeface="Cambria Math" panose="02040503050406030204" pitchFamily="18" charset="0"/>
                         </a:rPr>
                         <m:t>𝑣𝑒𝑐𝑡𝑜𝑟</m:t>
                       </m:r>
                       <m:r>
-                        <a:rPr lang="en-US" sz="2000" b="0" i="1" smtClean="0">
+                        <a:rPr lang="en-US" b="0" i="1" smtClean="0">
                           <a:latin typeface="Cambria Math" panose="02040503050406030204" pitchFamily="18" charset="0"/>
                         </a:rPr>
                         <m:t> ∈ </m:t>
@@ -4184,7 +4182,7 @@
                       <m:sSubSup>
                         <m:sSubSupPr>
                           <m:ctrlPr>
-                            <a:rPr lang="en-US" sz="2000" b="0" i="1" smtClean="0">
+                            <a:rPr lang="en-US" b="0" i="1" smtClean="0">
                               <a:latin typeface="Cambria Math" panose="02040503050406030204" pitchFamily="18" charset="0"/>
                               <a:ea typeface="Cambria Math" panose="02040503050406030204" pitchFamily="18" charset="0"/>
                             </a:rPr>
@@ -4192,7 +4190,7 @@
                         </m:sSubSupPr>
                         <m:e>
                           <m:r>
-                            <a:rPr lang="en-US" sz="2000" i="1" smtClean="0">
+                            <a:rPr lang="en-US" i="1" smtClean="0">
                               <a:latin typeface="Cambria Math" panose="02040503050406030204" pitchFamily="18" charset="0"/>
                               <a:ea typeface="Cambria Math" panose="02040503050406030204" pitchFamily="18" charset="0"/>
                             </a:rPr>
@@ -4201,7 +4199,7 @@
                         </m:e>
                         <m:sub>
                           <m:r>
-                            <a:rPr lang="en-US" sz="2000" b="0" i="1" smtClean="0">
+                            <a:rPr lang="en-US" b="0" i="1" smtClean="0">
                               <a:latin typeface="Cambria Math" panose="02040503050406030204" pitchFamily="18" charset="0"/>
                               <a:ea typeface="Cambria Math" panose="02040503050406030204" pitchFamily="18" charset="0"/>
                             </a:rPr>
@@ -4210,7 +4208,7 @@
                         </m:sub>
                         <m:sup>
                           <m:r>
-                            <a:rPr lang="en-US" sz="2000" b="0" i="1" smtClean="0">
+                            <a:rPr lang="en-US" b="0" i="1" smtClean="0">
                               <a:latin typeface="Cambria Math" panose="02040503050406030204" pitchFamily="18" charset="0"/>
                               <a:ea typeface="Cambria Math" panose="02040503050406030204" pitchFamily="18" charset="0"/>
                             </a:rPr>
@@ -4219,7 +4217,7 @@
                         </m:sup>
                       </m:sSubSup>
                       <m:r>
-                        <a:rPr lang="en-US" sz="2000" b="0" i="1" smtClean="0">
+                        <a:rPr lang="en-US" b="0" i="1" smtClean="0">
                           <a:latin typeface="Cambria Math" panose="02040503050406030204" pitchFamily="18" charset="0"/>
                           <a:ea typeface="Cambria Math" panose="02040503050406030204" pitchFamily="18" charset="0"/>
                         </a:rPr>
@@ -4228,7 +4226,7 @@
                     </m:oMath>
                   </m:oMathPara>
                 </a14:m>
-                <a:endParaRPr lang="en-US" sz="2000" b="0" dirty="0">
+                <a:endParaRPr lang="en-US" b="0" dirty="0">
                   <a:ea typeface="Cambria Math" panose="02040503050406030204" pitchFamily="18" charset="0"/>
                 </a:endParaRPr>
               </a:p>
@@ -4243,14 +4241,14 @@
                       <m:sSub>
                         <m:sSubPr>
                           <m:ctrlPr>
-                            <a:rPr lang="en-US" sz="2000" b="0" i="1" smtClean="0">
+                            <a:rPr lang="en-US" b="0" i="1" smtClean="0">
                               <a:latin typeface="Cambria Math" panose="02040503050406030204" pitchFamily="18" charset="0"/>
                             </a:rPr>
                           </m:ctrlPr>
                         </m:sSubPr>
                         <m:e>
                           <m:r>
-                            <a:rPr lang="en-US" sz="2000" b="0" i="1" smtClean="0">
+                            <a:rPr lang="en-US" b="0" i="1" smtClean="0">
                               <a:latin typeface="Cambria Math" panose="02040503050406030204" pitchFamily="18" charset="0"/>
                             </a:rPr>
                             <m:t>𝑚</m:t>
@@ -4258,7 +4256,7 @@
                         </m:e>
                         <m:sub>
                           <m:r>
-                            <a:rPr lang="en-US" sz="2000" b="0" i="1" smtClean="0">
+                            <a:rPr lang="en-US" b="0" i="1" smtClean="0">
                               <a:latin typeface="Cambria Math" panose="02040503050406030204" pitchFamily="18" charset="0"/>
                             </a:rPr>
                             <m:t>𝑤</m:t>
@@ -4266,31 +4264,31 @@
                         </m:sub>
                       </m:sSub>
                       <m:r>
-                        <a:rPr lang="en-US" sz="2000" b="0" i="1" smtClean="0">
+                        <a:rPr lang="en-US" b="0" i="1" smtClean="0">
                           <a:latin typeface="Cambria Math" panose="02040503050406030204" pitchFamily="18" charset="0"/>
                         </a:rPr>
                         <m:t>:</m:t>
                       </m:r>
                       <m:r>
-                        <a:rPr lang="en-US" sz="2000" b="0" i="1" smtClean="0">
+                        <a:rPr lang="en-US" b="0" i="1" smtClean="0">
                           <a:latin typeface="Cambria Math" panose="02040503050406030204" pitchFamily="18" charset="0"/>
                         </a:rPr>
                         <m:t>𝑚𝑜𝑑𝑢𝑙𝑒𝑠</m:t>
                       </m:r>
                       <m:r>
-                        <a:rPr lang="en-US" sz="2000" b="0" i="1" smtClean="0">
+                        <a:rPr lang="en-US" b="0" i="1" smtClean="0">
                           <a:latin typeface="Cambria Math" panose="02040503050406030204" pitchFamily="18" charset="0"/>
                         </a:rPr>
                         <m:t> </m:t>
                       </m:r>
                       <m:r>
-                        <a:rPr lang="en-US" sz="2000" b="0" i="1" smtClean="0">
+                        <a:rPr lang="en-US" b="0" i="1" smtClean="0">
                           <a:latin typeface="Cambria Math" panose="02040503050406030204" pitchFamily="18" charset="0"/>
                         </a:rPr>
                         <m:t>𝑤𝑎𝑛𝑡𝑒𝑑</m:t>
                       </m:r>
                       <m:r>
-                        <a:rPr lang="en-US" sz="2000" b="0" i="1" smtClean="0">
+                        <a:rPr lang="en-US" b="0" i="1" smtClean="0">
                           <a:latin typeface="Cambria Math" panose="02040503050406030204" pitchFamily="18" charset="0"/>
                         </a:rPr>
                         <m:t> </m:t>
@@ -4298,14 +4296,14 @@
                       <m:d>
                         <m:dPr>
                           <m:ctrlPr>
-                            <a:rPr lang="en-US" sz="2000" b="0" i="1" smtClean="0">
+                            <a:rPr lang="en-US" b="0" i="1" smtClean="0">
                               <a:latin typeface="Cambria Math" panose="02040503050406030204" pitchFamily="18" charset="0"/>
                             </a:rPr>
                           </m:ctrlPr>
                         </m:dPr>
                         <m:e>
                           <m:r>
-                            <a:rPr lang="en-US" sz="2000" b="0" i="1" smtClean="0">
+                            <a:rPr lang="en-US" b="0" i="1" smtClean="0">
                               <a:latin typeface="Cambria Math" panose="02040503050406030204" pitchFamily="18" charset="0"/>
                             </a:rPr>
                             <m:t>𝑟𝑎𝑛𝑘𝑒𝑑</m:t>
@@ -4313,7 +4311,7 @@
                         </m:e>
                       </m:d>
                       <m:r>
-                        <a:rPr lang="en-US" sz="2000" b="0" i="1" smtClean="0">
+                        <a:rPr lang="en-US" b="0" i="1" smtClean="0">
                           <a:latin typeface="Cambria Math" panose="02040503050406030204" pitchFamily="18" charset="0"/>
                           <a:ea typeface="Cambria Math" panose="02040503050406030204" pitchFamily="18" charset="0"/>
                         </a:rPr>
@@ -4322,7 +4320,7 @@
                       <m:sSup>
                         <m:sSupPr>
                           <m:ctrlPr>
-                            <a:rPr lang="en-US" sz="2000" b="0" i="1" smtClean="0">
+                            <a:rPr lang="en-US" b="0" i="1" smtClean="0">
                               <a:latin typeface="Cambria Math" panose="02040503050406030204" pitchFamily="18" charset="0"/>
                               <a:ea typeface="Cambria Math" panose="02040503050406030204" pitchFamily="18" charset="0"/>
                             </a:rPr>
@@ -4330,7 +4328,7 @@
                         </m:sSupPr>
                         <m:e>
                           <m:r>
-                            <a:rPr lang="en-US" sz="2000" i="1" smtClean="0">
+                            <a:rPr lang="en-US" i="1" smtClean="0">
                               <a:latin typeface="Cambria Math" panose="02040503050406030204" pitchFamily="18" charset="0"/>
                               <a:ea typeface="Cambria Math" panose="02040503050406030204" pitchFamily="18" charset="0"/>
                             </a:rPr>
@@ -4339,7 +4337,7 @@
                         </m:e>
                         <m:sup>
                           <m:r>
-                            <a:rPr lang="en-US" sz="2000" b="0" i="1" smtClean="0">
+                            <a:rPr lang="en-US" b="0" i="1" smtClean="0">
                               <a:latin typeface="Cambria Math" panose="02040503050406030204" pitchFamily="18" charset="0"/>
                               <a:ea typeface="Cambria Math" panose="02040503050406030204" pitchFamily="18" charset="0"/>
                             </a:rPr>
@@ -4350,7 +4348,7 @@
                     </m:oMath>
                   </m:oMathPara>
                 </a14:m>
-                <a:endParaRPr lang="en-US" sz="2000" dirty="0"/>
+                <a:endParaRPr lang="en-US" dirty="0"/>
               </a:p>
               <a:p>
                 <a:pPr/>
@@ -4363,14 +4361,14 @@
                       <m:sSub>
                         <m:sSubPr>
                           <m:ctrlPr>
-                            <a:rPr lang="en-US" sz="2000" b="0" i="1" smtClean="0">
+                            <a:rPr lang="en-US" b="0" i="1" smtClean="0">
                               <a:latin typeface="Cambria Math" panose="02040503050406030204" pitchFamily="18" charset="0"/>
                             </a:rPr>
                           </m:ctrlPr>
                         </m:sSubPr>
                         <m:e>
                           <m:r>
-                            <a:rPr lang="en-US" sz="2000" b="0" i="1" smtClean="0">
+                            <a:rPr lang="en-US" b="0" i="1" smtClean="0">
                               <a:latin typeface="Cambria Math" panose="02040503050406030204" pitchFamily="18" charset="0"/>
                             </a:rPr>
                             <m:t>𝑡</m:t>
@@ -4378,7 +4376,7 @@
                         </m:e>
                         <m:sub>
                           <m:r>
-                            <a:rPr lang="en-US" sz="2000" b="0" i="1" smtClean="0">
+                            <a:rPr lang="en-US" b="0" i="1" smtClean="0">
                               <a:latin typeface="Cambria Math" panose="02040503050406030204" pitchFamily="18" charset="0"/>
                             </a:rPr>
                             <m:t>𝑒</m:t>
@@ -4386,55 +4384,55 @@
                         </m:sub>
                       </m:sSub>
                       <m:r>
-                        <a:rPr lang="en-US" sz="2000" b="0" i="1" smtClean="0">
+                        <a:rPr lang="en-US" b="0" i="1" smtClean="0">
                           <a:latin typeface="Cambria Math" panose="02040503050406030204" pitchFamily="18" charset="0"/>
                         </a:rPr>
                         <m:t>:</m:t>
                       </m:r>
                       <m:r>
-                        <a:rPr lang="en-US" sz="2000" b="0" i="1" smtClean="0">
+                        <a:rPr lang="en-US" b="0" i="1" smtClean="0">
                           <a:latin typeface="Cambria Math" panose="02040503050406030204" pitchFamily="18" charset="0"/>
                         </a:rPr>
                         <m:t>𝑡𝑜𝑜</m:t>
                       </m:r>
                       <m:r>
-                        <a:rPr lang="en-US" sz="2000" b="0" i="1" smtClean="0">
+                        <a:rPr lang="en-US" b="0" i="1" smtClean="0">
                           <a:latin typeface="Cambria Math" panose="02040503050406030204" pitchFamily="18" charset="0"/>
                         </a:rPr>
                         <m:t> </m:t>
                       </m:r>
                       <m:r>
-                        <a:rPr lang="en-US" sz="2000" b="0" i="1" smtClean="0">
+                        <a:rPr lang="en-US" b="0" i="1" smtClean="0">
                           <a:latin typeface="Cambria Math" panose="02040503050406030204" pitchFamily="18" charset="0"/>
                         </a:rPr>
                         <m:t>𝑒𝑎𝑟𝑙𝑦</m:t>
                       </m:r>
                       <m:r>
-                        <a:rPr lang="en-US" sz="2000" b="0" i="1" smtClean="0">
+                        <a:rPr lang="en-US" b="0" i="1" smtClean="0">
                           <a:latin typeface="Cambria Math" panose="02040503050406030204" pitchFamily="18" charset="0"/>
                         </a:rPr>
                         <m:t> </m:t>
                       </m:r>
                       <m:r>
-                        <a:rPr lang="en-US" sz="2000" b="0" i="1" smtClean="0">
+                        <a:rPr lang="en-US" b="0" i="1" smtClean="0">
                           <a:latin typeface="Cambria Math" panose="02040503050406030204" pitchFamily="18" charset="0"/>
                         </a:rPr>
                         <m:t>𝑡𝑖𝑚𝑒</m:t>
                       </m:r>
                       <m:r>
-                        <a:rPr lang="en-US" sz="2000" b="0" i="1" smtClean="0">
+                        <a:rPr lang="en-US" b="0" i="1" smtClean="0">
                           <a:latin typeface="Cambria Math" panose="02040503050406030204" pitchFamily="18" charset="0"/>
                         </a:rPr>
                         <m:t> </m:t>
                       </m:r>
                       <m:r>
-                        <a:rPr lang="en-US" sz="2000" b="0" i="1" smtClean="0">
+                        <a:rPr lang="en-US" b="0" i="1" smtClean="0">
                           <a:latin typeface="Cambria Math" panose="02040503050406030204" pitchFamily="18" charset="0"/>
                         </a:rPr>
                         <m:t>𝑏𝑜𝑢𝑛𝑑𝑎𝑟𝑦</m:t>
                       </m:r>
                       <m:r>
-                        <a:rPr lang="en-US" sz="2000" b="0" i="1" smtClean="0">
+                        <a:rPr lang="en-US" b="0" i="1" smtClean="0">
                           <a:latin typeface="Cambria Math" panose="02040503050406030204" pitchFamily="18" charset="0"/>
                           <a:ea typeface="Cambria Math" panose="02040503050406030204" pitchFamily="18" charset="0"/>
                         </a:rPr>
@@ -4443,7 +4441,7 @@
                       <m:sSubSup>
                         <m:sSubSupPr>
                           <m:ctrlPr>
-                            <a:rPr lang="en-US" sz="2000" b="0" i="1" smtClean="0">
+                            <a:rPr lang="en-US" b="0" i="1" smtClean="0">
                               <a:latin typeface="Cambria Math" panose="02040503050406030204" pitchFamily="18" charset="0"/>
                               <a:ea typeface="Cambria Math" panose="02040503050406030204" pitchFamily="18" charset="0"/>
                             </a:rPr>
@@ -4451,7 +4449,7 @@
                         </m:sSubSupPr>
                         <m:e>
                           <m:r>
-                            <a:rPr lang="en-US" sz="2000" i="1" smtClean="0">
+                            <a:rPr lang="en-US" i="1" smtClean="0">
                               <a:latin typeface="Cambria Math" panose="02040503050406030204" pitchFamily="18" charset="0"/>
                               <a:ea typeface="Cambria Math" panose="02040503050406030204" pitchFamily="18" charset="0"/>
                             </a:rPr>
@@ -4460,7 +4458,7 @@
                         </m:e>
                         <m:sub>
                           <m:r>
-                            <a:rPr lang="en-US" sz="2000" b="0" i="1" smtClean="0">
+                            <a:rPr lang="en-US" b="0" i="1" smtClean="0">
                               <a:latin typeface="Cambria Math" panose="02040503050406030204" pitchFamily="18" charset="0"/>
                               <a:ea typeface="Cambria Math" panose="02040503050406030204" pitchFamily="18" charset="0"/>
                             </a:rPr>
@@ -4469,7 +4467,7 @@
                         </m:sub>
                         <m:sup>
                           <m:r>
-                            <a:rPr lang="en-US" sz="2000" b="0" i="1" smtClean="0">
+                            <a:rPr lang="en-US" b="0" i="1" smtClean="0">
                               <a:latin typeface="Cambria Math" panose="02040503050406030204" pitchFamily="18" charset="0"/>
                               <a:ea typeface="Cambria Math" panose="02040503050406030204" pitchFamily="18" charset="0"/>
                             </a:rPr>
@@ -4480,7 +4478,7 @@
                     </m:oMath>
                   </m:oMathPara>
                 </a14:m>
-                <a:endParaRPr lang="en-US" sz="2000" b="0" dirty="0"/>
+                <a:endParaRPr lang="en-US" b="0" dirty="0"/>
               </a:p>
               <a:p>
                 <a:pPr/>
@@ -4493,14 +4491,14 @@
                       <m:sSub>
                         <m:sSubPr>
                           <m:ctrlPr>
-                            <a:rPr lang="en-US" sz="2000" b="0" i="1" smtClean="0">
+                            <a:rPr lang="en-US" b="0" i="1" smtClean="0">
                               <a:latin typeface="Cambria Math" panose="02040503050406030204" pitchFamily="18" charset="0"/>
                             </a:rPr>
                           </m:ctrlPr>
                         </m:sSubPr>
                         <m:e>
                           <m:r>
-                            <a:rPr lang="en-US" sz="2000" b="0" i="1" smtClean="0">
+                            <a:rPr lang="en-US" b="0" i="1" smtClean="0">
                               <a:latin typeface="Cambria Math" panose="02040503050406030204" pitchFamily="18" charset="0"/>
                             </a:rPr>
                             <m:t>𝑡</m:t>
@@ -4508,7 +4506,7 @@
                         </m:e>
                         <m:sub>
                           <m:r>
-                            <a:rPr lang="en-US" sz="2000" b="0" i="1" smtClean="0">
+                            <a:rPr lang="en-US" b="0" i="1" smtClean="0">
                               <a:latin typeface="Cambria Math" panose="02040503050406030204" pitchFamily="18" charset="0"/>
                             </a:rPr>
                             <m:t>𝑙</m:t>
@@ -4516,55 +4514,55 @@
                         </m:sub>
                       </m:sSub>
                       <m:r>
-                        <a:rPr lang="en-US" sz="2000" b="0" i="1" smtClean="0">
+                        <a:rPr lang="en-US" b="0" i="1" smtClean="0">
                           <a:latin typeface="Cambria Math" panose="02040503050406030204" pitchFamily="18" charset="0"/>
                         </a:rPr>
                         <m:t>:</m:t>
                       </m:r>
                       <m:r>
-                        <a:rPr lang="en-US" sz="2000" b="0" i="1" smtClean="0">
+                        <a:rPr lang="en-US" b="0" i="1" smtClean="0">
                           <a:latin typeface="Cambria Math" panose="02040503050406030204" pitchFamily="18" charset="0"/>
                         </a:rPr>
                         <m:t>𝑡𝑜𝑜</m:t>
                       </m:r>
                       <m:r>
-                        <a:rPr lang="en-US" sz="2000" b="0" i="1" smtClean="0">
+                        <a:rPr lang="en-US" b="0" i="1" smtClean="0">
                           <a:latin typeface="Cambria Math" panose="02040503050406030204" pitchFamily="18" charset="0"/>
                         </a:rPr>
                         <m:t> </m:t>
                       </m:r>
                       <m:r>
-                        <a:rPr lang="en-US" sz="2000" b="0" i="1" smtClean="0">
+                        <a:rPr lang="en-US" b="0" i="1" smtClean="0">
                           <a:latin typeface="Cambria Math" panose="02040503050406030204" pitchFamily="18" charset="0"/>
                         </a:rPr>
                         <m:t>𝑙𝑎𝑡𝑒</m:t>
                       </m:r>
                       <m:r>
-                        <a:rPr lang="en-US" sz="2000" b="0" i="1" smtClean="0">
+                        <a:rPr lang="en-US" b="0" i="1" smtClean="0">
                           <a:latin typeface="Cambria Math" panose="02040503050406030204" pitchFamily="18" charset="0"/>
                         </a:rPr>
                         <m:t> </m:t>
                       </m:r>
                       <m:r>
-                        <a:rPr lang="en-US" sz="2000" b="0" i="1" smtClean="0">
+                        <a:rPr lang="en-US" b="0" i="1" smtClean="0">
                           <a:latin typeface="Cambria Math" panose="02040503050406030204" pitchFamily="18" charset="0"/>
                         </a:rPr>
                         <m:t>𝑡𝑖𝑚𝑒</m:t>
                       </m:r>
                       <m:r>
-                        <a:rPr lang="en-US" sz="2000" b="0" i="1" smtClean="0">
+                        <a:rPr lang="en-US" b="0" i="1" smtClean="0">
                           <a:latin typeface="Cambria Math" panose="02040503050406030204" pitchFamily="18" charset="0"/>
                         </a:rPr>
                         <m:t> </m:t>
                       </m:r>
                       <m:r>
-                        <a:rPr lang="en-US" sz="2000" b="0" i="1" smtClean="0">
+                        <a:rPr lang="en-US" b="0" i="1" smtClean="0">
                           <a:latin typeface="Cambria Math" panose="02040503050406030204" pitchFamily="18" charset="0"/>
                         </a:rPr>
                         <m:t>𝑏𝑜𝑢𝑛𝑑𝑎𝑟𝑦</m:t>
                       </m:r>
                       <m:r>
-                        <a:rPr lang="en-US" sz="2000" b="0" i="1" smtClean="0">
+                        <a:rPr lang="en-US" b="0" i="1" smtClean="0">
                           <a:latin typeface="Cambria Math" panose="02040503050406030204" pitchFamily="18" charset="0"/>
                           <a:ea typeface="Cambria Math" panose="02040503050406030204" pitchFamily="18" charset="0"/>
                         </a:rPr>
@@ -4573,7 +4571,7 @@
                       <m:sSubSup>
                         <m:sSubSupPr>
                           <m:ctrlPr>
-                            <a:rPr lang="en-US" sz="2000" b="0" i="1" smtClean="0">
+                            <a:rPr lang="en-US" b="0" i="1" smtClean="0">
                               <a:latin typeface="Cambria Math" panose="02040503050406030204" pitchFamily="18" charset="0"/>
                               <a:ea typeface="Cambria Math" panose="02040503050406030204" pitchFamily="18" charset="0"/>
                             </a:rPr>
@@ -4581,7 +4579,7 @@
                         </m:sSubSupPr>
                         <m:e>
                           <m:r>
-                            <a:rPr lang="en-US" sz="2000" i="1" smtClean="0">
+                            <a:rPr lang="en-US" i="1" smtClean="0">
                               <a:latin typeface="Cambria Math" panose="02040503050406030204" pitchFamily="18" charset="0"/>
                               <a:ea typeface="Cambria Math" panose="02040503050406030204" pitchFamily="18" charset="0"/>
                             </a:rPr>
@@ -4590,7 +4588,7 @@
                         </m:e>
                         <m:sub>
                           <m:r>
-                            <a:rPr lang="en-US" sz="2000" b="0" i="1" smtClean="0">
+                            <a:rPr lang="en-US" b="0" i="1" smtClean="0">
                               <a:latin typeface="Cambria Math" panose="02040503050406030204" pitchFamily="18" charset="0"/>
                               <a:ea typeface="Cambria Math" panose="02040503050406030204" pitchFamily="18" charset="0"/>
                             </a:rPr>
@@ -4599,7 +4597,7 @@
                         </m:sub>
                         <m:sup>
                           <m:r>
-                            <a:rPr lang="en-US" sz="2000" b="0" i="1" smtClean="0">
+                            <a:rPr lang="en-US" b="0" i="1" smtClean="0">
                               <a:latin typeface="Cambria Math" panose="02040503050406030204" pitchFamily="18" charset="0"/>
                               <a:ea typeface="Cambria Math" panose="02040503050406030204" pitchFamily="18" charset="0"/>
                             </a:rPr>
@@ -4610,11 +4608,11 @@
                     </m:oMath>
                   </m:oMathPara>
                 </a14:m>
-                <a:endParaRPr lang="en-US" sz="2000" b="0" dirty="0"/>
+                <a:endParaRPr lang="en-US" b="0" dirty="0"/>
               </a:p>
               <a:p>
                 <a:r>
-                  <a:rPr lang="en-US" sz="2000" dirty="0">
+                  <a:rPr lang="en-US" dirty="0">
                     <a:latin typeface="Cambria Math" panose="02040503050406030204" pitchFamily="18" charset="0"/>
                   </a:rPr>
                   <a:t>Output:</a:t>
@@ -4629,61 +4627,61 @@
                     </m:oMathParaPr>
                     <m:oMath xmlns:m="http://schemas.openxmlformats.org/officeDocument/2006/math">
                       <m:r>
-                        <a:rPr lang="en-US" sz="2000" b="0" i="1" smtClean="0">
+                        <a:rPr lang="en-US" b="0" i="1" smtClean="0">
                           <a:latin typeface="Cambria Math" panose="02040503050406030204" pitchFamily="18" charset="0"/>
                         </a:rPr>
                         <m:t>𝑥</m:t>
                       </m:r>
                       <m:r>
-                        <a:rPr lang="en-US" sz="2000" b="0" i="1" smtClean="0">
+                        <a:rPr lang="en-US" b="0" i="1" smtClean="0">
                           <a:latin typeface="Cambria Math" panose="02040503050406030204" pitchFamily="18" charset="0"/>
                         </a:rPr>
                         <m:t>:</m:t>
                       </m:r>
                       <m:r>
-                        <a:rPr lang="en-US" sz="2000" b="0" i="1" smtClean="0">
+                        <a:rPr lang="en-US" b="0" i="1" smtClean="0">
                           <a:latin typeface="Cambria Math" panose="02040503050406030204" pitchFamily="18" charset="0"/>
                         </a:rPr>
                         <m:t>𝑚𝑜𝑑𝑢𝑙𝑒</m:t>
                       </m:r>
                       <m:r>
-                        <a:rPr lang="en-US" sz="2000" b="0" i="1" smtClean="0">
+                        <a:rPr lang="en-US" b="0" i="1" smtClean="0">
                           <a:latin typeface="Cambria Math" panose="02040503050406030204" pitchFamily="18" charset="0"/>
                         </a:rPr>
                         <m:t>−</m:t>
                       </m:r>
                       <m:r>
-                        <a:rPr lang="en-US" sz="2000" b="0" i="1" smtClean="0">
+                        <a:rPr lang="en-US" b="0" i="1" smtClean="0">
                           <a:latin typeface="Cambria Math" panose="02040503050406030204" pitchFamily="18" charset="0"/>
                         </a:rPr>
                         <m:t>𝑠𝑒𝑐𝑡𝑖𝑜𝑛𝑎𝑙𝑠</m:t>
                       </m:r>
                       <m:r>
-                        <a:rPr lang="en-US" sz="2000" b="0" i="1" smtClean="0">
+                        <a:rPr lang="en-US" b="0" i="1" smtClean="0">
                           <a:latin typeface="Cambria Math" panose="02040503050406030204" pitchFamily="18" charset="0"/>
                         </a:rPr>
                         <m:t> </m:t>
                       </m:r>
                       <m:r>
-                        <a:rPr lang="en-US" sz="2000" b="0" i="1" smtClean="0">
+                        <a:rPr lang="en-US" b="0" i="1" smtClean="0">
                           <a:latin typeface="Cambria Math" panose="02040503050406030204" pitchFamily="18" charset="0"/>
                         </a:rPr>
                         <m:t>𝑡𝑜</m:t>
                       </m:r>
                       <m:r>
-                        <a:rPr lang="en-US" sz="2000" b="0" i="1" smtClean="0">
+                        <a:rPr lang="en-US" b="0" i="1" smtClean="0">
                           <a:latin typeface="Cambria Math" panose="02040503050406030204" pitchFamily="18" charset="0"/>
                         </a:rPr>
                         <m:t> </m:t>
                       </m:r>
                       <m:r>
-                        <a:rPr lang="en-US" sz="2000" b="0" i="1" smtClean="0">
+                        <a:rPr lang="en-US" b="0" i="1" smtClean="0">
                           <a:latin typeface="Cambria Math" panose="02040503050406030204" pitchFamily="18" charset="0"/>
                         </a:rPr>
                         <m:t>𝑡𝑎𝑘𝑒</m:t>
                       </m:r>
                       <m:r>
-                        <a:rPr lang="en-US" sz="2000" b="0" i="1" smtClean="0">
+                        <a:rPr lang="en-US" b="0" i="1" smtClean="0">
                           <a:latin typeface="Cambria Math" panose="02040503050406030204" pitchFamily="18" charset="0"/>
                         </a:rPr>
                         <m:t>∈ </m:t>
@@ -4691,7 +4689,7 @@
                       <m:sSubSup>
                         <m:sSubSupPr>
                           <m:ctrlPr>
-                            <a:rPr lang="en-US" sz="2000" b="0" i="1" smtClean="0">
+                            <a:rPr lang="en-US" b="0" i="1" smtClean="0">
                               <a:latin typeface="Cambria Math" panose="02040503050406030204" pitchFamily="18" charset="0"/>
                               <a:ea typeface="Cambria Math" panose="02040503050406030204" pitchFamily="18" charset="0"/>
                             </a:rPr>
@@ -4699,7 +4697,7 @@
                         </m:sSubSupPr>
                         <m:e>
                           <m:r>
-                            <a:rPr lang="en-US" sz="2000" i="1">
+                            <a:rPr lang="en-US" i="1">
                               <a:latin typeface="Cambria Math" panose="02040503050406030204" pitchFamily="18" charset="0"/>
                               <a:ea typeface="Cambria Math" panose="02040503050406030204" pitchFamily="18" charset="0"/>
                             </a:rPr>
@@ -4708,7 +4706,7 @@
                         </m:e>
                         <m:sub>
                           <m:r>
-                            <a:rPr lang="en-US" sz="2000" b="0" i="1" smtClean="0">
+                            <a:rPr lang="en-US" b="0" i="1" smtClean="0">
                               <a:latin typeface="Cambria Math" panose="02040503050406030204" pitchFamily="18" charset="0"/>
                               <a:ea typeface="Cambria Math" panose="02040503050406030204" pitchFamily="18" charset="0"/>
                             </a:rPr>
@@ -4717,7 +4715,7 @@
                         </m:sub>
                         <m:sup>
                           <m:r>
-                            <a:rPr lang="en-US" sz="2000" b="0" i="1" smtClean="0">
+                            <a:rPr lang="en-US" b="0" i="1" smtClean="0">
                               <a:latin typeface="Cambria Math" panose="02040503050406030204" pitchFamily="18" charset="0"/>
                               <a:ea typeface="Cambria Math" panose="02040503050406030204" pitchFamily="18" charset="0"/>
                             </a:rPr>
@@ -4728,7 +4726,7 @@
                     </m:oMath>
                   </m:oMathPara>
                 </a14:m>
-                <a:endParaRPr lang="en-US" sz="2000" b="0" i="1" dirty="0">
+                <a:endParaRPr lang="en-US" b="0" i="1" dirty="0">
                   <a:latin typeface="Cambria Math" panose="02040503050406030204" pitchFamily="18" charset="0"/>
                 </a:endParaRPr>
               </a:p>
@@ -4741,49 +4739,49 @@
                     </m:oMathParaPr>
                     <m:oMath xmlns:m="http://schemas.openxmlformats.org/officeDocument/2006/math">
                       <m:r>
-                        <a:rPr lang="en-US" sz="2000" b="0" i="1" smtClean="0">
+                        <a:rPr lang="en-US" b="0" i="1" smtClean="0">
                           <a:latin typeface="Cambria Math" panose="02040503050406030204" pitchFamily="18" charset="0"/>
                         </a:rPr>
                         <m:t>𝑧</m:t>
                       </m:r>
                       <m:r>
-                        <a:rPr lang="en-US" sz="2000" b="0" i="1" smtClean="0">
+                        <a:rPr lang="en-US" b="0" i="1" smtClean="0">
                           <a:latin typeface="Cambria Math" panose="02040503050406030204" pitchFamily="18" charset="0"/>
                         </a:rPr>
                         <m:t>:</m:t>
                       </m:r>
                       <m:r>
-                        <a:rPr lang="en-US" sz="2000" b="0" i="1" smtClean="0">
+                        <a:rPr lang="en-US" b="0" i="1" smtClean="0">
                           <a:latin typeface="Cambria Math" panose="02040503050406030204" pitchFamily="18" charset="0"/>
                         </a:rPr>
                         <m:t>𝑚𝑜𝑑𝑢𝑙𝑒𝑠</m:t>
                       </m:r>
                       <m:r>
-                        <a:rPr lang="en-US" sz="2000" b="0" i="1" smtClean="0">
+                        <a:rPr lang="en-US" b="0" i="1" smtClean="0">
                           <a:latin typeface="Cambria Math" panose="02040503050406030204" pitchFamily="18" charset="0"/>
                         </a:rPr>
                         <m:t> </m:t>
                       </m:r>
                       <m:r>
-                        <a:rPr lang="en-US" sz="2000" b="0" i="1" smtClean="0">
+                        <a:rPr lang="en-US" b="0" i="1" smtClean="0">
                           <a:latin typeface="Cambria Math" panose="02040503050406030204" pitchFamily="18" charset="0"/>
                         </a:rPr>
                         <m:t>𝑡𝑜</m:t>
                       </m:r>
                       <m:r>
-                        <a:rPr lang="en-US" sz="2000" b="0" i="1" smtClean="0">
+                        <a:rPr lang="en-US" b="0" i="1" smtClean="0">
                           <a:latin typeface="Cambria Math" panose="02040503050406030204" pitchFamily="18" charset="0"/>
                         </a:rPr>
                         <m:t> </m:t>
                       </m:r>
                       <m:r>
-                        <a:rPr lang="en-US" sz="2000" b="0" i="1" smtClean="0">
+                        <a:rPr lang="en-US" b="0" i="1" smtClean="0">
                           <a:latin typeface="Cambria Math" panose="02040503050406030204" pitchFamily="18" charset="0"/>
                         </a:rPr>
                         <m:t>𝑡𝑎𝑘𝑒</m:t>
                       </m:r>
                       <m:r>
-                        <a:rPr lang="en-US" sz="2000" b="0" i="1" smtClean="0">
+                        <a:rPr lang="en-US" b="0" i="1" smtClean="0">
                           <a:latin typeface="Cambria Math" panose="02040503050406030204" pitchFamily="18" charset="0"/>
                           <a:ea typeface="Cambria Math" panose="02040503050406030204" pitchFamily="18" charset="0"/>
                         </a:rPr>
@@ -4792,7 +4790,7 @@
                       <m:sSubSup>
                         <m:sSubSupPr>
                           <m:ctrlPr>
-                            <a:rPr lang="en-US" sz="2000" b="0" i="1" smtClean="0">
+                            <a:rPr lang="en-US" b="0" i="1" smtClean="0">
                               <a:latin typeface="Cambria Math" panose="02040503050406030204" pitchFamily="18" charset="0"/>
                               <a:ea typeface="Cambria Math" panose="02040503050406030204" pitchFamily="18" charset="0"/>
                             </a:rPr>
@@ -4800,7 +4798,7 @@
                         </m:sSubSupPr>
                         <m:e>
                           <m:r>
-                            <a:rPr lang="en-US" sz="2000" i="1">
+                            <a:rPr lang="en-US" i="1">
                               <a:latin typeface="Cambria Math" panose="02040503050406030204" pitchFamily="18" charset="0"/>
                               <a:ea typeface="Cambria Math" panose="02040503050406030204" pitchFamily="18" charset="0"/>
                             </a:rPr>
@@ -4809,7 +4807,7 @@
                         </m:e>
                         <m:sub>
                           <m:r>
-                            <a:rPr lang="en-US" sz="2000" b="0" i="1" smtClean="0">
+                            <a:rPr lang="en-US" b="0" i="1" smtClean="0">
                               <a:latin typeface="Cambria Math" panose="02040503050406030204" pitchFamily="18" charset="0"/>
                               <a:ea typeface="Cambria Math" panose="02040503050406030204" pitchFamily="18" charset="0"/>
                             </a:rPr>
@@ -4818,7 +4816,7 @@
                         </m:sub>
                         <m:sup>
                           <m:r>
-                            <a:rPr lang="en-US" sz="2000" b="0" i="1" smtClean="0">
+                            <a:rPr lang="en-US" b="0" i="1" smtClean="0">
                               <a:latin typeface="Cambria Math" panose="02040503050406030204" pitchFamily="18" charset="0"/>
                               <a:ea typeface="Cambria Math" panose="02040503050406030204" pitchFamily="18" charset="0"/>
                             </a:rPr>
@@ -4829,7 +4827,7 @@
                     </m:oMath>
                   </m:oMathPara>
                 </a14:m>
-                <a:endParaRPr lang="en-US" sz="2000" b="0" dirty="0"/>
+                <a:endParaRPr lang="en-US" b="0" dirty="0"/>
               </a:p>
               <a:p>
                 <a:pPr/>
@@ -4840,37 +4838,37 @@
                     </m:oMathParaPr>
                     <m:oMath xmlns:m="http://schemas.openxmlformats.org/officeDocument/2006/math">
                       <m:r>
-                        <a:rPr lang="en-US" sz="2000" b="0" i="1" smtClean="0">
-                          <a:latin typeface="Cambria Math" panose="02040503050406030204" pitchFamily="18" charset="0"/>
-                        </a:rPr>
-                        <m:t>𝑦</m:t>
-                      </m:r>
-                      <m:r>
-                        <a:rPr lang="en-US" sz="2000" b="0" i="1" smtClean="0">
+                        <a:rPr lang="en-US" b="0" i="1" smtClean="0">
+                          <a:latin typeface="Cambria Math" panose="02040503050406030204" pitchFamily="18" charset="0"/>
+                        </a:rPr>
+                        <m:t>𝑇</m:t>
+                      </m:r>
+                      <m:r>
+                        <a:rPr lang="en-US" b="0" i="1" smtClean="0">
                           <a:latin typeface="Cambria Math" panose="02040503050406030204" pitchFamily="18" charset="0"/>
                         </a:rPr>
                         <m:t>:</m:t>
                       </m:r>
                       <m:r>
-                        <a:rPr lang="en-US" sz="2000" b="0" i="1" smtClean="0">
+                        <a:rPr lang="en-US" b="0" i="1" smtClean="0">
                           <a:latin typeface="Cambria Math" panose="02040503050406030204" pitchFamily="18" charset="0"/>
                         </a:rPr>
                         <m:t>𝑦𝑜𝑢𝑟</m:t>
                       </m:r>
                       <m:r>
-                        <a:rPr lang="en-US" sz="2000" b="0" i="1" smtClean="0">
+                        <a:rPr lang="en-US" b="0" i="1" smtClean="0">
                           <a:latin typeface="Cambria Math" panose="02040503050406030204" pitchFamily="18" charset="0"/>
                         </a:rPr>
                         <m:t> </m:t>
                       </m:r>
                       <m:r>
-                        <a:rPr lang="en-US" sz="2000" b="0" i="1" smtClean="0">
+                        <a:rPr lang="en-US" b="0" i="1" smtClean="0">
                           <a:latin typeface="Cambria Math" panose="02040503050406030204" pitchFamily="18" charset="0"/>
                         </a:rPr>
                         <m:t>𝑡𝑖𝑚𝑒𝑡𝑎𝑏𝑙𝑒</m:t>
                       </m:r>
                       <m:r>
-                        <a:rPr lang="en-US" sz="2000" b="0" i="1" smtClean="0">
+                        <a:rPr lang="en-US" b="0" i="1" smtClean="0">
                           <a:latin typeface="Cambria Math" panose="02040503050406030204" pitchFamily="18" charset="0"/>
                           <a:ea typeface="Cambria Math" panose="02040503050406030204" pitchFamily="18" charset="0"/>
                         </a:rPr>
@@ -4879,7 +4877,7 @@
                       <m:sSubSup>
                         <m:sSubSupPr>
                           <m:ctrlPr>
-                            <a:rPr lang="en-US" sz="2000" b="0" i="1" smtClean="0">
+                            <a:rPr lang="en-US" b="0" i="1" smtClean="0">
                               <a:latin typeface="Cambria Math" panose="02040503050406030204" pitchFamily="18" charset="0"/>
                               <a:ea typeface="Cambria Math" panose="02040503050406030204" pitchFamily="18" charset="0"/>
                             </a:rPr>
@@ -4887,7 +4885,7 @@
                         </m:sSubSupPr>
                         <m:e>
                           <m:r>
-                            <a:rPr lang="en-US" sz="2000" i="1">
+                            <a:rPr lang="en-US" i="1">
                               <a:latin typeface="Cambria Math" panose="02040503050406030204" pitchFamily="18" charset="0"/>
                               <a:ea typeface="Cambria Math" panose="02040503050406030204" pitchFamily="18" charset="0"/>
                             </a:rPr>
@@ -4896,7 +4894,7 @@
                         </m:e>
                         <m:sub>
                           <m:r>
-                            <a:rPr lang="en-US" sz="2000" b="0" i="1" smtClean="0">
+                            <a:rPr lang="en-US" b="0" i="1" smtClean="0">
                               <a:latin typeface="Cambria Math" panose="02040503050406030204" pitchFamily="18" charset="0"/>
                               <a:ea typeface="Cambria Math" panose="02040503050406030204" pitchFamily="18" charset="0"/>
                             </a:rPr>
@@ -4905,7 +4903,7 @@
                         </m:sub>
                         <m:sup>
                           <m:r>
-                            <a:rPr lang="en-US" sz="2000" b="0" i="1" smtClean="0">
+                            <a:rPr lang="en-US" b="0" i="1" smtClean="0">
                               <a:latin typeface="Cambria Math" panose="02040503050406030204" pitchFamily="18" charset="0"/>
                               <a:ea typeface="Cambria Math" panose="02040503050406030204" pitchFamily="18" charset="0"/>
                             </a:rPr>
@@ -4916,10 +4914,77 @@
                     </m:oMath>
                   </m:oMathPara>
                 </a14:m>
-                <a:endParaRPr lang="en-US" sz="2000" b="0" dirty="0"/>
+                <a:endParaRPr lang="en-US" b="0" dirty="0"/>
               </a:p>
               <a:p>
-                <a:endParaRPr lang="en-US" sz="2000" b="0" dirty="0"/>
+                <a:pPr/>
+                <a14:m>
+                  <m:oMathPara xmlns:m="http://schemas.openxmlformats.org/officeDocument/2006/math">
+                    <m:oMathParaPr>
+                      <m:jc m:val="centerGroup"/>
+                    </m:oMathParaPr>
+                    <m:oMath xmlns:m="http://schemas.openxmlformats.org/officeDocument/2006/math">
+                      <m:r>
+                        <a:rPr lang="en-US" b="0" i="1" smtClean="0">
+                          <a:latin typeface="Cambria Math" panose="02040503050406030204" pitchFamily="18" charset="0"/>
+                        </a:rPr>
+                        <m:t>𝑦</m:t>
+                      </m:r>
+                      <m:r>
+                        <a:rPr lang="en-US" b="0" i="1" smtClean="0">
+                          <a:latin typeface="Cambria Math" panose="02040503050406030204" pitchFamily="18" charset="0"/>
+                        </a:rPr>
+                        <m:t>:</m:t>
+                      </m:r>
+                      <m:r>
+                        <a:rPr lang="en-US" b="0" i="1" smtClean="0">
+                          <a:latin typeface="Cambria Math" panose="02040503050406030204" pitchFamily="18" charset="0"/>
+                        </a:rPr>
+                        <m:t>𝑠𝑐h𝑜𝑜𝑙𝑖𝑛𝑔</m:t>
+                      </m:r>
+                      <m:r>
+                        <a:rPr lang="en-US" b="0" i="1" smtClean="0">
+                          <a:latin typeface="Cambria Math" panose="02040503050406030204" pitchFamily="18" charset="0"/>
+                        </a:rPr>
+                        <m:t> </m:t>
+                      </m:r>
+                      <m:r>
+                        <a:rPr lang="en-US" b="0" i="1" smtClean="0">
+                          <a:latin typeface="Cambria Math" panose="02040503050406030204" pitchFamily="18" charset="0"/>
+                        </a:rPr>
+                        <m:t>𝑑𝑎𝑦𝑠</m:t>
+                      </m:r>
+                      <m:r>
+                        <a:rPr lang="en-US" b="0" i="1" smtClean="0">
+                          <a:latin typeface="Cambria Math" panose="02040503050406030204" pitchFamily="18" charset="0"/>
+                        </a:rPr>
+                        <m:t> </m:t>
+                      </m:r>
+                      <m:r>
+                        <a:rPr lang="en-US" b="0" i="1" smtClean="0">
+                          <a:latin typeface="Cambria Math" panose="02040503050406030204" pitchFamily="18" charset="0"/>
+                        </a:rPr>
+                        <m:t>𝑖𝑛</m:t>
+                      </m:r>
+                      <m:r>
+                        <a:rPr lang="en-US" b="0" i="1" smtClean="0">
+                          <a:latin typeface="Cambria Math" panose="02040503050406030204" pitchFamily="18" charset="0"/>
+                        </a:rPr>
+                        <m:t> </m:t>
+                      </m:r>
+                      <m:r>
+                        <a:rPr lang="en-US" b="0" i="1" smtClean="0">
+                          <a:latin typeface="Cambria Math" panose="02040503050406030204" pitchFamily="18" charset="0"/>
+                        </a:rPr>
+                        <m:t>𝑤𝑒𝑒𝑘</m:t>
+                      </m:r>
+                    </m:oMath>
+                  </m:oMathPara>
+                </a14:m>
+                <a:endParaRPr lang="en-US" b="0" dirty="0"/>
+              </a:p>
+              <a:p>
+                <a:endParaRPr lang="en-US" b="0" dirty="0"/>
               </a:p>
             </p:txBody>
           </p:sp>
@@ -4941,8 +5006,8 @@
             </p:nvSpPr>
             <p:spPr>
               <a:xfrm>
-                <a:off x="1030884" y="268085"/>
-                <a:ext cx="9704248" cy="6771084"/>
+                <a:off x="1030884" y="243512"/>
+                <a:ext cx="9704248" cy="6370975"/>
               </a:xfrm>
               <a:prstGeom prst="rect">
                 <a:avLst/>
@@ -4950,7 +5015,7 @@
               <a:blipFill>
                 <a:blip r:embed="rId2"/>
                 <a:stretch>
-                  <a:fillRect l="-1570" t="-1170"/>
+                  <a:fillRect l="-1445" t="-1340"/>
                 </a:stretch>
               </a:blipFill>
             </p:spPr>
@@ -8171,8 +8236,8 @@
           <a:chExt cx="0" cy="0"/>
         </a:xfrm>
       </p:grpSpPr>
-      <mc:AlternateContent xmlns:mc="http://schemas.openxmlformats.org/markup-compatibility/2006">
-        <mc:Choice xmlns:a14="http://schemas.microsoft.com/office/drawing/2010/main" Requires="a14">
+      <mc:AlternateContent xmlns:mc="http://schemas.openxmlformats.org/markup-compatibility/2006" xmlns:a14="http://schemas.microsoft.com/office/drawing/2010/main">
+        <mc:Choice Requires="a14">
           <p:sp>
             <p:nvSpPr>
               <p:cNvPr id="4" name="TextBox 3">
@@ -9507,7 +9572,7 @@
             </p:txBody>
           </p:sp>
         </mc:Choice>
-        <mc:Fallback>
+        <mc:Fallback xmlns="">
           <p:sp>
             <p:nvSpPr>
               <p:cNvPr id="4" name="TextBox 3">
@@ -9582,8 +9647,8 @@
           <a:chExt cx="0" cy="0"/>
         </a:xfrm>
       </p:grpSpPr>
-      <mc:AlternateContent xmlns:mc="http://schemas.openxmlformats.org/markup-compatibility/2006">
-        <mc:Choice xmlns:a14="http://schemas.microsoft.com/office/drawing/2010/main" Requires="a14">
+      <mc:AlternateContent xmlns:mc="http://schemas.openxmlformats.org/markup-compatibility/2006" xmlns:a14="http://schemas.microsoft.com/office/drawing/2010/main">
+        <mc:Choice Requires="a14">
           <p:sp>
             <p:nvSpPr>
               <p:cNvPr id="4" name="TextBox 3">
@@ -10349,7 +10414,7 @@
             </p:txBody>
           </p:sp>
         </mc:Choice>
-        <mc:Fallback>
+        <mc:Fallback xmlns="">
           <p:sp>
             <p:nvSpPr>
               <p:cNvPr id="4" name="TextBox 3">
@@ -10424,8 +10489,8 @@
           <a:chExt cx="0" cy="0"/>
         </a:xfrm>
       </p:grpSpPr>
-      <mc:AlternateContent xmlns:mc="http://schemas.openxmlformats.org/markup-compatibility/2006">
-        <mc:Choice xmlns:a14="http://schemas.microsoft.com/office/drawing/2010/main" Requires="a14">
+      <mc:AlternateContent xmlns:mc="http://schemas.openxmlformats.org/markup-compatibility/2006" xmlns:a14="http://schemas.microsoft.com/office/drawing/2010/main">
+        <mc:Choice Requires="a14">
           <p:sp>
             <p:nvSpPr>
               <p:cNvPr id="4" name="TextBox 3">
@@ -11251,6 +11316,7 @@
                 </a:r>
               </a:p>
               <a:p>
+                <a:pPr/>
                 <a14:m>
                   <m:oMathPara xmlns:m="http://schemas.openxmlformats.org/officeDocument/2006/math">
                     <m:oMathParaPr>
@@ -11600,7 +11666,7 @@
             </p:txBody>
           </p:sp>
         </mc:Choice>
-        <mc:Fallback>
+        <mc:Fallback xmlns="">
           <p:sp>
             <p:nvSpPr>
               <p:cNvPr id="4" name="TextBox 3">
@@ -11649,86 +11715,6 @@
     <p:extLst>
       <p:ext uri="{BB962C8B-B14F-4D97-AF65-F5344CB8AC3E}">
         <p14:creationId xmlns:p14="http://schemas.microsoft.com/office/powerpoint/2010/main" val="3447635687"/>
-      </p:ext>
-    </p:extLst>
-  </p:cSld>
-  <p:clrMapOvr>
-    <a:masterClrMapping/>
-  </p:clrMapOvr>
-</p:sld>
-</file>
-
-<file path=ppt/slides/slide8.xml><?xml version="1.0" encoding="utf-8"?>
-<p:sld xmlns:a="http://schemas.openxmlformats.org/drawingml/2006/main" xmlns:r="http://schemas.openxmlformats.org/officeDocument/2006/relationships" xmlns:p="http://schemas.openxmlformats.org/presentationml/2006/main">
-  <p:cSld>
-    <p:spTree>
-      <p:nvGrpSpPr>
-        <p:cNvPr id="1" name=""/>
-        <p:cNvGrpSpPr/>
-        <p:nvPr/>
-      </p:nvGrpSpPr>
-      <p:grpSpPr>
-        <a:xfrm>
-          <a:off x="0" y="0"/>
-          <a:ext cx="0" cy="0"/>
-          <a:chOff x="0" y="0"/>
-          <a:chExt cx="0" cy="0"/>
-        </a:xfrm>
-      </p:grpSpPr>
-      <p:sp>
-        <p:nvSpPr>
-          <p:cNvPr id="2" name="Title 1">
-            <a:extLst>
-              <a:ext uri="{FF2B5EF4-FFF2-40B4-BE49-F238E27FC236}">
-                <a16:creationId xmlns:a16="http://schemas.microsoft.com/office/drawing/2014/main" id="{25F622DC-AB65-477C-94DD-F65575B7E833}"/>
-              </a:ext>
-            </a:extLst>
-          </p:cNvPr>
-          <p:cNvSpPr>
-            <a:spLocks noGrp="1"/>
-          </p:cNvSpPr>
-          <p:nvPr>
-            <p:ph type="title"/>
-          </p:nvPr>
-        </p:nvSpPr>
-        <p:spPr/>
-        <p:txBody>
-          <a:bodyPr/>
-          <a:lstStyle/>
-          <a:p>
-            <a:endParaRPr lang="en-US" dirty="0"/>
-          </a:p>
-        </p:txBody>
-      </p:sp>
-      <p:sp>
-        <p:nvSpPr>
-          <p:cNvPr id="3" name="Content Placeholder 2">
-            <a:extLst>
-              <a:ext uri="{FF2B5EF4-FFF2-40B4-BE49-F238E27FC236}">
-                <a16:creationId xmlns:a16="http://schemas.microsoft.com/office/drawing/2014/main" id="{7CA45487-D16A-4F3D-82B9-95756622A70C}"/>
-              </a:ext>
-            </a:extLst>
-          </p:cNvPr>
-          <p:cNvSpPr>
-            <a:spLocks noGrp="1"/>
-          </p:cNvSpPr>
-          <p:nvPr>
-            <p:ph idx="1"/>
-          </p:nvPr>
-        </p:nvSpPr>
-        <p:spPr/>
-        <p:txBody>
-          <a:bodyPr/>
-          <a:lstStyle/>
-          <a:p>
-            <a:endParaRPr lang="en-US" dirty="0"/>
-          </a:p>
-        </p:txBody>
-      </p:sp>
-    </p:spTree>
-    <p:extLst>
-      <p:ext uri="{BB962C8B-B14F-4D97-AF65-F5344CB8AC3E}">
-        <p14:creationId xmlns:p14="http://schemas.microsoft.com/office/powerpoint/2010/main" val="1222136112"/>
       </p:ext>
     </p:extLst>
   </p:cSld>

</xml_diff>